<commit_message>
Updating Polyglot Persistence talk for NDC
</commit_message>
<xml_diff>
--- a/polyglotpersistence/Real World Polyglot Persistence.pptx
+++ b/polyglotpersistence/Real World Polyglot Persistence.pptx
@@ -2,7 +2,7 @@
 <file path=ppt/presentation.xml><?xml version="1.0" encoding="utf-8"?>
 <p:presentation xmlns:a="http://schemas.openxmlformats.org/drawingml/2006/main" xmlns:r="http://schemas.openxmlformats.org/officeDocument/2006/relationships" xmlns:p="http://schemas.openxmlformats.org/presentationml/2006/main" saveSubsetFonts="1" autoCompressPictures="0">
   <p:sldMasterIdLst>
-    <p:sldMasterId id="2147483648" r:id="rId1"/>
+    <p:sldMasterId id="2147483674" r:id="rId1"/>
   </p:sldMasterIdLst>
   <p:notesMasterIdLst>
     <p:notesMasterId r:id="rId17"/>
@@ -24,7 +24,7 @@
     <p:sldId id="266" r:id="rId15"/>
     <p:sldId id="268" r:id="rId16"/>
   </p:sldIdLst>
-  <p:sldSz cx="9144000" cy="6858000" type="screen4x3"/>
+  <p:sldSz cx="12192000" cy="6858000"/>
   <p:notesSz cx="6858000" cy="9144000"/>
   <p:defaultTextStyle>
     <a:defPPr>
@@ -121,7 +121,36 @@
       </a:defRPr>
     </a:lvl9pPr>
   </p:defaultTextStyle>
-  <p:extLst/>
+  <p:extLst>
+    <p:ext uri="{EFAFB233-063F-42B5-8137-9DF3F51BA10A}">
+      <p15:sldGuideLst xmlns:p15="http://schemas.microsoft.com/office/powerpoint/2012/main">
+        <p15:guide id="1" orient="horz" pos="2160" userDrawn="1">
+          <p15:clr>
+            <a:srgbClr val="A4A3A4"/>
+          </p15:clr>
+        </p15:guide>
+        <p15:guide id="2" pos="3840" userDrawn="1">
+          <p15:clr>
+            <a:srgbClr val="A4A3A4"/>
+          </p15:clr>
+        </p15:guide>
+      </p15:sldGuideLst>
+    </p:ext>
+    <p:ext uri="{2D200454-40CA-4A62-9FC3-DE9A4176ACB9}">
+      <p15:notesGuideLst xmlns:p15="http://schemas.microsoft.com/office/powerpoint/2012/main">
+        <p15:guide id="1" orient="horz" pos="2880">
+          <p15:clr>
+            <a:srgbClr val="A4A3A4"/>
+          </p15:clr>
+        </p15:guide>
+        <p15:guide id="2" pos="2160">
+          <p15:clr>
+            <a:srgbClr val="A4A3A4"/>
+          </p15:clr>
+        </p15:guide>
+      </p15:notesGuideLst>
+    </p:ext>
+  </p:extLst>
 </p:presentation>
 </file>
 
@@ -1336,7 +1365,7 @@
             <a:alphaOff val="0"/>
           </a:schemeClr>
         </a:solidFill>
-        <a:ln w="25400" cap="flat" cmpd="sng" algn="ctr">
+        <a:ln w="12700" cap="flat" cmpd="sng" algn="ctr">
           <a:solidFill>
             <a:schemeClr val="lt1">
               <a:hueOff val="0"/>
@@ -1346,6 +1375,7 @@
             </a:schemeClr>
           </a:solidFill>
           <a:prstDash val="solid"/>
+          <a:miter lim="800000"/>
         </a:ln>
         <a:effectLst/>
       </dsp:spPr>
@@ -1423,7 +1453,7 @@
             <a:alphaOff val="0"/>
           </a:schemeClr>
         </a:solidFill>
-        <a:ln w="25400" cap="flat" cmpd="sng" algn="ctr">
+        <a:ln w="12700" cap="flat" cmpd="sng" algn="ctr">
           <a:solidFill>
             <a:schemeClr val="lt1">
               <a:hueOff val="0"/>
@@ -1433,6 +1463,7 @@
             </a:schemeClr>
           </a:solidFill>
           <a:prstDash val="solid"/>
+          <a:miter lim="800000"/>
         </a:ln>
         <a:effectLst/>
       </dsp:spPr>
@@ -1510,7 +1541,7 @@
             <a:alphaOff val="0"/>
           </a:schemeClr>
         </a:solidFill>
-        <a:ln w="25400" cap="flat" cmpd="sng" algn="ctr">
+        <a:ln w="12700" cap="flat" cmpd="sng" algn="ctr">
           <a:solidFill>
             <a:schemeClr val="lt1">
               <a:hueOff val="0"/>
@@ -1520,6 +1551,7 @@
             </a:schemeClr>
           </a:solidFill>
           <a:prstDash val="solid"/>
+          <a:miter lim="800000"/>
         </a:ln>
         <a:effectLst/>
       </dsp:spPr>
@@ -3216,7 +3248,7 @@
           <a:p>
             <a:fld id="{D4DDA21E-28F9-429C-875C-CFE3ACB8D770}" type="datetimeFigureOut">
               <a:rPr lang="en-US" smtClean="0"/>
-              <a:t>12/10/2012</a:t>
+              <a:t>6/12/2013</a:t>
             </a:fld>
             <a:endParaRPr lang="en-US"/>
           </a:p>
@@ -3234,8 +3266,8 @@
         </p:nvSpPr>
         <p:spPr>
           <a:xfrm>
-            <a:off x="1143000" y="685800"/>
-            <a:ext cx="4572000" cy="3429000"/>
+            <a:off x="381000" y="685800"/>
+            <a:ext cx="6096000" cy="3429000"/>
           </a:xfrm>
           <a:prstGeom prst="rect">
             <a:avLst/>
@@ -3511,7 +3543,12 @@
             <p:ph type="sldImg"/>
           </p:nvPr>
         </p:nvSpPr>
-        <p:spPr/>
+        <p:spPr>
+          <a:xfrm>
+            <a:off x="381000" y="685800"/>
+            <a:ext cx="6096000" cy="3429000"/>
+          </a:xfrm>
+        </p:spPr>
       </p:sp>
       <p:sp>
         <p:nvSpPr>
@@ -3587,6 +3624,168 @@
       </p:grpSpPr>
       <p:sp>
         <p:nvSpPr>
+          <p:cNvPr id="2" name="Title 1"/>
+          <p:cNvSpPr>
+            <a:spLocks noGrp="1"/>
+          </p:cNvSpPr>
+          <p:nvPr>
+            <p:ph type="ctrTitle"/>
+          </p:nvPr>
+        </p:nvSpPr>
+        <p:spPr>
+          <a:xfrm>
+            <a:off x="1524000" y="1122363"/>
+            <a:ext cx="9144000" cy="2387600"/>
+          </a:xfrm>
+        </p:spPr>
+        <p:txBody>
+          <a:bodyPr anchor="b"/>
+          <a:lstStyle>
+            <a:lvl1pPr algn="ctr">
+              <a:defRPr sz="6000"/>
+            </a:lvl1pPr>
+          </a:lstStyle>
+          <a:p>
+            <a:r>
+              <a:rPr lang="en-US" smtClean="0"/>
+              <a:t>Click to edit Master title style</a:t>
+            </a:r>
+            <a:endParaRPr lang="en-US" dirty="0"/>
+          </a:p>
+        </p:txBody>
+      </p:sp>
+      <p:sp>
+        <p:nvSpPr>
+          <p:cNvPr id="3" name="Subtitle 2"/>
+          <p:cNvSpPr>
+            <a:spLocks noGrp="1"/>
+          </p:cNvSpPr>
+          <p:nvPr>
+            <p:ph type="subTitle" idx="1"/>
+          </p:nvPr>
+        </p:nvSpPr>
+        <p:spPr>
+          <a:xfrm>
+            <a:off x="1524000" y="3602038"/>
+            <a:ext cx="9144000" cy="1655762"/>
+          </a:xfrm>
+        </p:spPr>
+        <p:txBody>
+          <a:bodyPr/>
+          <a:lstStyle>
+            <a:lvl1pPr marL="0" indent="0" algn="ctr">
+              <a:buNone/>
+              <a:defRPr sz="2400"/>
+            </a:lvl1pPr>
+            <a:lvl2pPr marL="457200" indent="0" algn="ctr">
+              <a:buNone/>
+              <a:defRPr sz="2000"/>
+            </a:lvl2pPr>
+            <a:lvl3pPr marL="914400" indent="0" algn="ctr">
+              <a:buNone/>
+              <a:defRPr sz="1800"/>
+            </a:lvl3pPr>
+            <a:lvl4pPr marL="1371600" indent="0" algn="ctr">
+              <a:buNone/>
+              <a:defRPr sz="1600"/>
+            </a:lvl4pPr>
+            <a:lvl5pPr marL="1828800" indent="0" algn="ctr">
+              <a:buNone/>
+              <a:defRPr sz="1600"/>
+            </a:lvl5pPr>
+            <a:lvl6pPr marL="2286000" indent="0" algn="ctr">
+              <a:buNone/>
+              <a:defRPr sz="1600"/>
+            </a:lvl6pPr>
+            <a:lvl7pPr marL="2743200" indent="0" algn="ctr">
+              <a:buNone/>
+              <a:defRPr sz="1600"/>
+            </a:lvl7pPr>
+            <a:lvl8pPr marL="3200400" indent="0" algn="ctr">
+              <a:buNone/>
+              <a:defRPr sz="1600"/>
+            </a:lvl8pPr>
+            <a:lvl9pPr marL="3657600" indent="0" algn="ctr">
+              <a:buNone/>
+              <a:defRPr sz="1600"/>
+            </a:lvl9pPr>
+          </a:lstStyle>
+          <a:p>
+            <a:r>
+              <a:rPr lang="en-US" smtClean="0"/>
+              <a:t>Click to edit Master subtitle style</a:t>
+            </a:r>
+            <a:endParaRPr lang="en-US" dirty="0"/>
+          </a:p>
+        </p:txBody>
+      </p:sp>
+      <p:sp>
+        <p:nvSpPr>
+          <p:cNvPr id="4" name="Date Placeholder 3"/>
+          <p:cNvSpPr>
+            <a:spLocks noGrp="1"/>
+          </p:cNvSpPr>
+          <p:nvPr>
+            <p:ph type="dt" sz="half" idx="10"/>
+          </p:nvPr>
+        </p:nvSpPr>
+        <p:spPr/>
+        <p:txBody>
+          <a:bodyPr/>
+          <a:lstStyle/>
+          <a:p>
+            <a:fld id="{EB044DB1-568E-4964-A02F-CCDCEAA70EF3}" type="datetimeFigureOut">
+              <a:rPr lang="en-US" smtClean="0"/>
+              <a:t>6/12/2013</a:t>
+            </a:fld>
+            <a:endParaRPr lang="en-US"/>
+          </a:p>
+        </p:txBody>
+      </p:sp>
+      <p:sp>
+        <p:nvSpPr>
+          <p:cNvPr id="5" name="Footer Placeholder 4"/>
+          <p:cNvSpPr>
+            <a:spLocks noGrp="1"/>
+          </p:cNvSpPr>
+          <p:nvPr>
+            <p:ph type="ftr" sz="quarter" idx="11"/>
+          </p:nvPr>
+        </p:nvSpPr>
+        <p:spPr/>
+        <p:txBody>
+          <a:bodyPr/>
+          <a:lstStyle/>
+          <a:p>
+            <a:endParaRPr lang="en-US"/>
+          </a:p>
+        </p:txBody>
+      </p:sp>
+      <p:sp>
+        <p:nvSpPr>
+          <p:cNvPr id="6" name="Slide Number Placeholder 5"/>
+          <p:cNvSpPr>
+            <a:spLocks noGrp="1"/>
+          </p:cNvSpPr>
+          <p:nvPr>
+            <p:ph type="sldNum" sz="quarter" idx="12"/>
+          </p:nvPr>
+        </p:nvSpPr>
+        <p:spPr/>
+        <p:txBody>
+          <a:bodyPr/>
+          <a:lstStyle/>
+          <a:p>
+            <a:fld id="{51CCE939-0FF0-4622-80D4-F7CCF5AA2A8E}" type="slidenum">
+              <a:rPr lang="en-US" smtClean="0"/>
+              <a:t>‹#›</a:t>
+            </a:fld>
+            <a:endParaRPr lang="en-US"/>
+          </a:p>
+        </p:txBody>
+      </p:sp>
+      <p:sp>
+        <p:nvSpPr>
           <p:cNvPr id="7" name="Rectangle 6"/>
           <p:cNvSpPr/>
           <p:nvPr userDrawn="1">
@@ -3598,7 +3797,7 @@
         <p:spPr>
           <a:xfrm>
             <a:off x="0" y="0"/>
-            <a:ext cx="9144000" cy="3600450"/>
+            <a:ext cx="12192000" cy="3600450"/>
           </a:xfrm>
           <a:prstGeom prst="rect">
             <a:avLst/>
@@ -3630,7 +3829,7 @@
           <a:lstStyle/>
           <a:p>
             <a:pPr algn="ctr"/>
-            <a:endParaRPr lang="en-US">
+            <a:endParaRPr lang="en-US" sz="1800">
               <a:solidFill>
                 <a:srgbClr val="0079C1"/>
               </a:solidFill>
@@ -3638,217 +3837,16 @@
           </a:p>
         </p:txBody>
       </p:sp>
-      <p:sp>
-        <p:nvSpPr>
-          <p:cNvPr id="2" name="Title 1"/>
-          <p:cNvSpPr>
-            <a:spLocks noGrp="1"/>
-          </p:cNvSpPr>
-          <p:nvPr>
-            <p:ph type="ctrTitle"/>
-            <p:custDataLst>
-              <p:tags r:id="rId2"/>
-            </p:custDataLst>
-          </p:nvPr>
-        </p:nvSpPr>
-        <p:spPr>
-          <a:xfrm>
-            <a:off x="0" y="2130425"/>
-            <a:ext cx="9144000" cy="1470025"/>
-          </a:xfrm>
-          <a:noFill/>
-        </p:spPr>
-        <p:txBody>
-          <a:bodyPr/>
-          <a:lstStyle>
-            <a:lvl1pPr>
-              <a:defRPr>
-                <a:solidFill>
-                  <a:srgbClr val="177EC5"/>
-                </a:solidFill>
-              </a:defRPr>
-            </a:lvl1pPr>
-          </a:lstStyle>
-          <a:p>
-            <a:r>
-              <a:rPr lang="en-US" smtClean="0"/>
-              <a:t>Click to edit Master title style</a:t>
-            </a:r>
-            <a:endParaRPr lang="en-US" dirty="0"/>
-          </a:p>
-        </p:txBody>
-      </p:sp>
-      <p:sp>
-        <p:nvSpPr>
-          <p:cNvPr id="3" name="Subtitle 2"/>
-          <p:cNvSpPr>
-            <a:spLocks noGrp="1"/>
-          </p:cNvSpPr>
-          <p:nvPr>
-            <p:ph type="subTitle" idx="1"/>
-            <p:custDataLst>
-              <p:tags r:id="rId3"/>
-            </p:custDataLst>
-          </p:nvPr>
-        </p:nvSpPr>
-        <p:spPr>
-          <a:xfrm>
-            <a:off x="1371600" y="3886200"/>
-            <a:ext cx="6400800" cy="1752600"/>
-          </a:xfrm>
-        </p:spPr>
-        <p:txBody>
-          <a:bodyPr anchor="ctr"/>
-          <a:lstStyle>
-            <a:lvl1pPr marL="0" indent="0" algn="ctr">
-              <a:buNone/>
-              <a:defRPr>
-                <a:solidFill>
-                  <a:srgbClr val="404040"/>
-                </a:solidFill>
-              </a:defRPr>
-            </a:lvl1pPr>
-            <a:lvl2pPr marL="457200" indent="0" algn="ctr">
-              <a:buNone/>
-              <a:defRPr>
-                <a:solidFill>
-                  <a:schemeClr val="tx1">
-                    <a:tint val="75000"/>
-                  </a:schemeClr>
-                </a:solidFill>
-              </a:defRPr>
-            </a:lvl2pPr>
-            <a:lvl3pPr marL="914400" indent="0" algn="ctr">
-              <a:buNone/>
-              <a:defRPr>
-                <a:solidFill>
-                  <a:schemeClr val="tx1">
-                    <a:tint val="75000"/>
-                  </a:schemeClr>
-                </a:solidFill>
-              </a:defRPr>
-            </a:lvl3pPr>
-            <a:lvl4pPr marL="1371600" indent="0" algn="ctr">
-              <a:buNone/>
-              <a:defRPr>
-                <a:solidFill>
-                  <a:schemeClr val="tx1">
-                    <a:tint val="75000"/>
-                  </a:schemeClr>
-                </a:solidFill>
-              </a:defRPr>
-            </a:lvl4pPr>
-            <a:lvl5pPr marL="1828800" indent="0" algn="ctr">
-              <a:buNone/>
-              <a:defRPr>
-                <a:solidFill>
-                  <a:schemeClr val="tx1">
-                    <a:tint val="75000"/>
-                  </a:schemeClr>
-                </a:solidFill>
-              </a:defRPr>
-            </a:lvl5pPr>
-            <a:lvl6pPr marL="2286000" indent="0" algn="ctr">
-              <a:buNone/>
-              <a:defRPr>
-                <a:solidFill>
-                  <a:schemeClr val="tx1">
-                    <a:tint val="75000"/>
-                  </a:schemeClr>
-                </a:solidFill>
-              </a:defRPr>
-            </a:lvl6pPr>
-            <a:lvl7pPr marL="2743200" indent="0" algn="ctr">
-              <a:buNone/>
-              <a:defRPr>
-                <a:solidFill>
-                  <a:schemeClr val="tx1">
-                    <a:tint val="75000"/>
-                  </a:schemeClr>
-                </a:solidFill>
-              </a:defRPr>
-            </a:lvl7pPr>
-            <a:lvl8pPr marL="3200400" indent="0" algn="ctr">
-              <a:buNone/>
-              <a:defRPr>
-                <a:solidFill>
-                  <a:schemeClr val="tx1">
-                    <a:tint val="75000"/>
-                  </a:schemeClr>
-                </a:solidFill>
-              </a:defRPr>
-            </a:lvl8pPr>
-            <a:lvl9pPr marL="3657600" indent="0" algn="ctr">
-              <a:buNone/>
-              <a:defRPr>
-                <a:solidFill>
-                  <a:schemeClr val="tx1">
-                    <a:tint val="75000"/>
-                  </a:schemeClr>
-                </a:solidFill>
-              </a:defRPr>
-            </a:lvl9pPr>
-          </a:lstStyle>
-          <a:p>
-            <a:r>
-              <a:rPr lang="en-US" smtClean="0"/>
-              <a:t>Click to edit Master subtitle style</a:t>
-            </a:r>
-            <a:endParaRPr lang="en-US"/>
-          </a:p>
-        </p:txBody>
-      </p:sp>
-      <p:pic>
-        <p:nvPicPr>
-          <p:cNvPr id="9" name="Picture 8" descr="Logo.png"/>
-          <p:cNvPicPr>
-            <a:picLocks noChangeAspect="1"/>
-          </p:cNvPicPr>
-          <p:nvPr userDrawn="1">
-            <p:custDataLst>
-              <p:tags r:id="rId4"/>
-            </p:custDataLst>
-          </p:nvPr>
-        </p:nvPicPr>
-        <p:blipFill>
-          <a:blip r:embed="rId6">
-            <a:extLst>
-              <a:ext uri="{28A0092B-C50C-407E-A947-70E740481C1C}">
-                <a14:useLocalDpi xmlns:a14="http://schemas.microsoft.com/office/drawing/2010/main" val="0"/>
-              </a:ext>
-            </a:extLst>
-          </a:blip>
-          <a:stretch>
-            <a:fillRect/>
-          </a:stretch>
-        </p:blipFill>
-        <p:spPr>
-          <a:xfrm>
-            <a:off x="1449263" y="230434"/>
-            <a:ext cx="6245475" cy="1441264"/>
-          </a:xfrm>
-          <a:prstGeom prst="rect">
-            <a:avLst/>
-          </a:prstGeom>
-        </p:spPr>
-      </p:pic>
     </p:spTree>
     <p:extLst>
       <p:ext uri="{BB962C8B-B14F-4D97-AF65-F5344CB8AC3E}">
-        <p14:creationId xmlns:p14="http://schemas.microsoft.com/office/powerpoint/2010/main" val="1125505740"/>
+        <p14:creationId xmlns:p14="http://schemas.microsoft.com/office/powerpoint/2010/main" val="3758702079"/>
       </p:ext>
     </p:extLst>
   </p:cSld>
   <p:clrMapOvr>
     <a:masterClrMapping/>
   </p:clrMapOvr>
-  <p:timing>
-    <p:tnLst>
-      <p:par>
-        <p:cTn id="1" dur="indefinite" restart="never" nodeType="tmRoot"/>
-      </p:par>
-    </p:tnLst>
-  </p:timing>
 </p:sldLayout>
 </file>
 
@@ -3877,9 +3875,6 @@
           </p:cNvSpPr>
           <p:nvPr>
             <p:ph type="title"/>
-            <p:custDataLst>
-              <p:tags r:id="rId1"/>
-            </p:custDataLst>
           </p:nvPr>
         </p:nvSpPr>
         <p:spPr/>
@@ -3891,7 +3886,7 @@
               <a:rPr lang="en-US" smtClean="0"/>
               <a:t>Click to edit Master title style</a:t>
             </a:r>
-            <a:endParaRPr lang="en-US"/>
+            <a:endParaRPr lang="en-US" dirty="0"/>
           </a:p>
         </p:txBody>
       </p:sp>
@@ -3903,9 +3898,6 @@
           </p:cNvSpPr>
           <p:nvPr>
             <p:ph type="body" orient="vert" idx="1"/>
-            <p:custDataLst>
-              <p:tags r:id="rId2"/>
-            </p:custDataLst>
           </p:nvPr>
         </p:nvSpPr>
         <p:spPr/>
@@ -3946,6 +3938,71 @@
               <a:rPr lang="en-US" smtClean="0"/>
               <a:t>Fifth level</a:t>
             </a:r>
+            <a:endParaRPr lang="en-US" dirty="0"/>
+          </a:p>
+        </p:txBody>
+      </p:sp>
+      <p:sp>
+        <p:nvSpPr>
+          <p:cNvPr id="4" name="Date Placeholder 3"/>
+          <p:cNvSpPr>
+            <a:spLocks noGrp="1"/>
+          </p:cNvSpPr>
+          <p:nvPr>
+            <p:ph type="dt" sz="half" idx="10"/>
+          </p:nvPr>
+        </p:nvSpPr>
+        <p:spPr/>
+        <p:txBody>
+          <a:bodyPr/>
+          <a:lstStyle/>
+          <a:p>
+            <a:fld id="{EB044DB1-568E-4964-A02F-CCDCEAA70EF3}" type="datetimeFigureOut">
+              <a:rPr lang="en-US" smtClean="0"/>
+              <a:t>6/12/2013</a:t>
+            </a:fld>
+            <a:endParaRPr lang="en-US"/>
+          </a:p>
+        </p:txBody>
+      </p:sp>
+      <p:sp>
+        <p:nvSpPr>
+          <p:cNvPr id="5" name="Footer Placeholder 4"/>
+          <p:cNvSpPr>
+            <a:spLocks noGrp="1"/>
+          </p:cNvSpPr>
+          <p:nvPr>
+            <p:ph type="ftr" sz="quarter" idx="11"/>
+          </p:nvPr>
+        </p:nvSpPr>
+        <p:spPr/>
+        <p:txBody>
+          <a:bodyPr/>
+          <a:lstStyle/>
+          <a:p>
+            <a:endParaRPr lang="en-US"/>
+          </a:p>
+        </p:txBody>
+      </p:sp>
+      <p:sp>
+        <p:nvSpPr>
+          <p:cNvPr id="6" name="Slide Number Placeholder 5"/>
+          <p:cNvSpPr>
+            <a:spLocks noGrp="1"/>
+          </p:cNvSpPr>
+          <p:nvPr>
+            <p:ph type="sldNum" sz="quarter" idx="12"/>
+          </p:nvPr>
+        </p:nvSpPr>
+        <p:spPr/>
+        <p:txBody>
+          <a:bodyPr/>
+          <a:lstStyle/>
+          <a:p>
+            <a:fld id="{51CCE939-0FF0-4622-80D4-F7CCF5AA2A8E}" type="slidenum">
+              <a:rPr lang="en-US" smtClean="0"/>
+              <a:t>‹#›</a:t>
+            </a:fld>
             <a:endParaRPr lang="en-US"/>
           </a:p>
         </p:txBody>
@@ -3953,7 +4010,7 @@
     </p:spTree>
     <p:extLst>
       <p:ext uri="{BB962C8B-B14F-4D97-AF65-F5344CB8AC3E}">
-        <p14:creationId xmlns:p14="http://schemas.microsoft.com/office/powerpoint/2010/main" val="1681873687"/>
+        <p14:creationId xmlns:p14="http://schemas.microsoft.com/office/powerpoint/2010/main" val="2776046340"/>
       </p:ext>
     </p:extLst>
   </p:cSld>
@@ -3988,15 +4045,12 @@
           </p:cNvSpPr>
           <p:nvPr>
             <p:ph type="title" orient="vert"/>
-            <p:custDataLst>
-              <p:tags r:id="rId1"/>
-            </p:custDataLst>
           </p:nvPr>
         </p:nvSpPr>
         <p:spPr>
           <a:xfrm>
-            <a:off x="6629400" y="274638"/>
-            <a:ext cx="2057400" cy="5851525"/>
+            <a:off x="8724900" y="365125"/>
+            <a:ext cx="2628900" cy="5811838"/>
           </a:xfrm>
         </p:spPr>
         <p:txBody>
@@ -4007,7 +4061,7 @@
               <a:rPr lang="en-US" smtClean="0"/>
               <a:t>Click to edit Master title style</a:t>
             </a:r>
-            <a:endParaRPr lang="en-US"/>
+            <a:endParaRPr lang="en-US" dirty="0"/>
           </a:p>
         </p:txBody>
       </p:sp>
@@ -4019,6 +4073,211 @@
           </p:cNvSpPr>
           <p:nvPr>
             <p:ph type="body" orient="vert" idx="1"/>
+          </p:nvPr>
+        </p:nvSpPr>
+        <p:spPr>
+          <a:xfrm>
+            <a:off x="838200" y="365125"/>
+            <a:ext cx="7734300" cy="5811838"/>
+          </a:xfrm>
+        </p:spPr>
+        <p:txBody>
+          <a:bodyPr vert="eaVert"/>
+          <a:lstStyle/>
+          <a:p>
+            <a:pPr lvl="0"/>
+            <a:r>
+              <a:rPr lang="en-US" smtClean="0"/>
+              <a:t>Click to edit Master text styles</a:t>
+            </a:r>
+          </a:p>
+          <a:p>
+            <a:pPr lvl="1"/>
+            <a:r>
+              <a:rPr lang="en-US" smtClean="0"/>
+              <a:t>Second level</a:t>
+            </a:r>
+          </a:p>
+          <a:p>
+            <a:pPr lvl="2"/>
+            <a:r>
+              <a:rPr lang="en-US" smtClean="0"/>
+              <a:t>Third level</a:t>
+            </a:r>
+          </a:p>
+          <a:p>
+            <a:pPr lvl="3"/>
+            <a:r>
+              <a:rPr lang="en-US" smtClean="0"/>
+              <a:t>Fourth level</a:t>
+            </a:r>
+          </a:p>
+          <a:p>
+            <a:pPr lvl="4"/>
+            <a:r>
+              <a:rPr lang="en-US" smtClean="0"/>
+              <a:t>Fifth level</a:t>
+            </a:r>
+            <a:endParaRPr lang="en-US" dirty="0"/>
+          </a:p>
+        </p:txBody>
+      </p:sp>
+      <p:sp>
+        <p:nvSpPr>
+          <p:cNvPr id="4" name="Date Placeholder 3"/>
+          <p:cNvSpPr>
+            <a:spLocks noGrp="1"/>
+          </p:cNvSpPr>
+          <p:nvPr>
+            <p:ph type="dt" sz="half" idx="10"/>
+          </p:nvPr>
+        </p:nvSpPr>
+        <p:spPr/>
+        <p:txBody>
+          <a:bodyPr/>
+          <a:lstStyle/>
+          <a:p>
+            <a:fld id="{EB044DB1-568E-4964-A02F-CCDCEAA70EF3}" type="datetimeFigureOut">
+              <a:rPr lang="en-US" smtClean="0"/>
+              <a:t>6/12/2013</a:t>
+            </a:fld>
+            <a:endParaRPr lang="en-US"/>
+          </a:p>
+        </p:txBody>
+      </p:sp>
+      <p:sp>
+        <p:nvSpPr>
+          <p:cNvPr id="5" name="Footer Placeholder 4"/>
+          <p:cNvSpPr>
+            <a:spLocks noGrp="1"/>
+          </p:cNvSpPr>
+          <p:nvPr>
+            <p:ph type="ftr" sz="quarter" idx="11"/>
+          </p:nvPr>
+        </p:nvSpPr>
+        <p:spPr/>
+        <p:txBody>
+          <a:bodyPr/>
+          <a:lstStyle/>
+          <a:p>
+            <a:endParaRPr lang="en-US"/>
+          </a:p>
+        </p:txBody>
+      </p:sp>
+      <p:sp>
+        <p:nvSpPr>
+          <p:cNvPr id="6" name="Slide Number Placeholder 5"/>
+          <p:cNvSpPr>
+            <a:spLocks noGrp="1"/>
+          </p:cNvSpPr>
+          <p:nvPr>
+            <p:ph type="sldNum" sz="quarter" idx="12"/>
+          </p:nvPr>
+        </p:nvSpPr>
+        <p:spPr/>
+        <p:txBody>
+          <a:bodyPr/>
+          <a:lstStyle/>
+          <a:p>
+            <a:fld id="{51CCE939-0FF0-4622-80D4-F7CCF5AA2A8E}" type="slidenum">
+              <a:rPr lang="en-US" smtClean="0"/>
+              <a:t>‹#›</a:t>
+            </a:fld>
+            <a:endParaRPr lang="en-US"/>
+          </a:p>
+        </p:txBody>
+      </p:sp>
+    </p:spTree>
+    <p:extLst>
+      <p:ext uri="{BB962C8B-B14F-4D97-AF65-F5344CB8AC3E}">
+        <p14:creationId xmlns:p14="http://schemas.microsoft.com/office/powerpoint/2010/main" val="2954623359"/>
+      </p:ext>
+    </p:extLst>
+  </p:cSld>
+  <p:clrMapOvr>
+    <a:masterClrMapping/>
+  </p:clrMapOvr>
+</p:sldLayout>
+</file>
+
+<file path=ppt/slideLayouts/slideLayout12.xml><?xml version="1.0" encoding="utf-8"?>
+<p:sldLayout xmlns:a="http://schemas.openxmlformats.org/drawingml/2006/main" xmlns:r="http://schemas.openxmlformats.org/officeDocument/2006/relationships" xmlns:p="http://schemas.openxmlformats.org/presentationml/2006/main" userDrawn="1">
+  <p:cSld name="1_Section Header">
+    <p:spTree>
+      <p:nvGrpSpPr>
+        <p:cNvPr id="1" name=""/>
+        <p:cNvGrpSpPr/>
+        <p:nvPr/>
+      </p:nvGrpSpPr>
+      <p:grpSpPr>
+        <a:xfrm>
+          <a:off x="0" y="0"/>
+          <a:ext cx="0" cy="0"/>
+          <a:chOff x="0" y="0"/>
+          <a:chExt cx="0" cy="0"/>
+        </a:xfrm>
+      </p:grpSpPr>
+      <p:sp>
+        <p:nvSpPr>
+          <p:cNvPr id="8" name="Rectangle 7"/>
+          <p:cNvSpPr/>
+          <p:nvPr userDrawn="1">
+            <p:custDataLst>
+              <p:tags r:id="rId1"/>
+            </p:custDataLst>
+          </p:nvPr>
+        </p:nvSpPr>
+        <p:spPr>
+          <a:xfrm flipV="1">
+            <a:off x="0" y="3431458"/>
+            <a:ext cx="12192000" cy="3426542"/>
+          </a:xfrm>
+          <a:prstGeom prst="rect">
+            <a:avLst/>
+          </a:prstGeom>
+          <a:solidFill>
+            <a:srgbClr val="FFFFFF"/>
+          </a:solidFill>
+          <a:ln>
+            <a:noFill/>
+          </a:ln>
+          <a:effectLst/>
+        </p:spPr>
+        <p:style>
+          <a:lnRef idx="1">
+            <a:schemeClr val="accent1"/>
+          </a:lnRef>
+          <a:fillRef idx="3">
+            <a:schemeClr val="accent1"/>
+          </a:fillRef>
+          <a:effectRef idx="2">
+            <a:schemeClr val="accent1"/>
+          </a:effectRef>
+          <a:fontRef idx="minor">
+            <a:schemeClr val="lt1"/>
+          </a:fontRef>
+        </p:style>
+        <p:txBody>
+          <a:bodyPr rtlCol="0" anchor="ctr"/>
+          <a:lstStyle/>
+          <a:p>
+            <a:pPr algn="ctr"/>
+            <a:endParaRPr lang="en-US" sz="1800">
+              <a:solidFill>
+                <a:srgbClr val="0079C1"/>
+              </a:solidFill>
+            </a:endParaRPr>
+          </a:p>
+        </p:txBody>
+      </p:sp>
+      <p:sp>
+        <p:nvSpPr>
+          <p:cNvPr id="2" name="Title 1"/>
+          <p:cNvSpPr>
+            <a:spLocks noGrp="1"/>
+          </p:cNvSpPr>
+          <p:nvPr>
+            <p:ph type="title"/>
             <p:custDataLst>
               <p:tags r:id="rId2"/>
             </p:custDataLst>
@@ -4026,55 +4285,150 @@
         </p:nvSpPr>
         <p:spPr>
           <a:xfrm>
-            <a:off x="457200" y="274638"/>
-            <a:ext cx="6019800" cy="5851525"/>
+            <a:off x="0" y="3431459"/>
+            <a:ext cx="12192000" cy="1362075"/>
           </a:xfrm>
+          <a:noFill/>
         </p:spPr>
         <p:txBody>
-          <a:bodyPr vert="eaVert"/>
-          <a:lstStyle/>
-          <a:p>
-            <a:pPr lvl="0"/>
+          <a:bodyPr anchor="ctr"/>
+          <a:lstStyle>
+            <a:lvl1pPr algn="ctr">
+              <a:defRPr sz="4000" b="0" strike="noStrike" cap="none" normalizeH="0" baseline="0"/>
+            </a:lvl1pPr>
+          </a:lstStyle>
+          <a:p>
             <a:r>
               <a:rPr lang="en-US" smtClean="0"/>
-              <a:t>Click to edit Master text styles</a:t>
-            </a:r>
-          </a:p>
-          <a:p>
-            <a:pPr lvl="1"/>
-            <a:r>
-              <a:rPr lang="en-US" smtClean="0"/>
-              <a:t>Second level</a:t>
-            </a:r>
-          </a:p>
-          <a:p>
-            <a:pPr lvl="2"/>
-            <a:r>
-              <a:rPr lang="en-US" smtClean="0"/>
-              <a:t>Third level</a:t>
-            </a:r>
-          </a:p>
-          <a:p>
-            <a:pPr lvl="3"/>
-            <a:r>
-              <a:rPr lang="en-US" smtClean="0"/>
-              <a:t>Fourth level</a:t>
-            </a:r>
-          </a:p>
-          <a:p>
-            <a:pPr lvl="4"/>
-            <a:r>
-              <a:rPr lang="en-US" smtClean="0"/>
-              <a:t>Fifth level</a:t>
-            </a:r>
-            <a:endParaRPr lang="en-US"/>
+              <a:t>Click to edit Master title style</a:t>
+            </a:r>
+            <a:endParaRPr lang="en-US" dirty="0"/>
           </a:p>
         </p:txBody>
       </p:sp>
     </p:spTree>
     <p:extLst>
       <p:ext uri="{BB962C8B-B14F-4D97-AF65-F5344CB8AC3E}">
-        <p14:creationId xmlns:p14="http://schemas.microsoft.com/office/powerpoint/2010/main" val="3796211701"/>
+        <p14:creationId xmlns:p14="http://schemas.microsoft.com/office/powerpoint/2010/main" val="2290409989"/>
+      </p:ext>
+    </p:extLst>
+  </p:cSld>
+  <p:clrMapOvr>
+    <a:masterClrMapping/>
+  </p:clrMapOvr>
+</p:sldLayout>
+</file>
+
+<file path=ppt/slideLayouts/slideLayout13.xml><?xml version="1.0" encoding="utf-8"?>
+<p:sldLayout xmlns:a="http://schemas.openxmlformats.org/drawingml/2006/main" xmlns:r="http://schemas.openxmlformats.org/officeDocument/2006/relationships" xmlns:p="http://schemas.openxmlformats.org/presentationml/2006/main" userDrawn="1">
+  <p:cSld name="2_Section Header">
+    <p:spTree>
+      <p:nvGrpSpPr>
+        <p:cNvPr id="1" name=""/>
+        <p:cNvGrpSpPr/>
+        <p:nvPr/>
+      </p:nvGrpSpPr>
+      <p:grpSpPr>
+        <a:xfrm>
+          <a:off x="0" y="0"/>
+          <a:ext cx="0" cy="0"/>
+          <a:chOff x="0" y="0"/>
+          <a:chExt cx="0" cy="0"/>
+        </a:xfrm>
+      </p:grpSpPr>
+      <p:sp>
+        <p:nvSpPr>
+          <p:cNvPr id="8" name="Rectangle 7"/>
+          <p:cNvSpPr/>
+          <p:nvPr userDrawn="1">
+            <p:custDataLst>
+              <p:tags r:id="rId1"/>
+            </p:custDataLst>
+          </p:nvPr>
+        </p:nvSpPr>
+        <p:spPr>
+          <a:xfrm flipV="1">
+            <a:off x="0" y="3431458"/>
+            <a:ext cx="12192000" cy="3426542"/>
+          </a:xfrm>
+          <a:prstGeom prst="rect">
+            <a:avLst/>
+          </a:prstGeom>
+          <a:solidFill>
+            <a:srgbClr val="FFFFFF"/>
+          </a:solidFill>
+          <a:ln>
+            <a:noFill/>
+          </a:ln>
+          <a:effectLst/>
+        </p:spPr>
+        <p:style>
+          <a:lnRef idx="1">
+            <a:schemeClr val="accent1"/>
+          </a:lnRef>
+          <a:fillRef idx="3">
+            <a:schemeClr val="accent1"/>
+          </a:fillRef>
+          <a:effectRef idx="2">
+            <a:schemeClr val="accent1"/>
+          </a:effectRef>
+          <a:fontRef idx="minor">
+            <a:schemeClr val="lt1"/>
+          </a:fontRef>
+        </p:style>
+        <p:txBody>
+          <a:bodyPr rtlCol="0" anchor="ctr"/>
+          <a:lstStyle/>
+          <a:p>
+            <a:pPr algn="ctr"/>
+            <a:endParaRPr lang="en-US" sz="1800">
+              <a:solidFill>
+                <a:srgbClr val="0079C1"/>
+              </a:solidFill>
+            </a:endParaRPr>
+          </a:p>
+        </p:txBody>
+      </p:sp>
+      <p:sp>
+        <p:nvSpPr>
+          <p:cNvPr id="2" name="Title 1"/>
+          <p:cNvSpPr>
+            <a:spLocks noGrp="1"/>
+          </p:cNvSpPr>
+          <p:nvPr>
+            <p:ph type="title"/>
+            <p:custDataLst>
+              <p:tags r:id="rId2"/>
+            </p:custDataLst>
+          </p:nvPr>
+        </p:nvSpPr>
+        <p:spPr>
+          <a:xfrm>
+            <a:off x="0" y="3431459"/>
+            <a:ext cx="12192000" cy="1362075"/>
+          </a:xfrm>
+          <a:noFill/>
+        </p:spPr>
+        <p:txBody>
+          <a:bodyPr anchor="ctr"/>
+          <a:lstStyle>
+            <a:lvl1pPr algn="ctr">
+              <a:defRPr sz="4000" b="0" strike="noStrike" cap="none" normalizeH="0" baseline="0"/>
+            </a:lvl1pPr>
+          </a:lstStyle>
+          <a:p>
+            <a:r>
+              <a:rPr lang="en-US" smtClean="0"/>
+              <a:t>Click to edit Master title style</a:t>
+            </a:r>
+            <a:endParaRPr lang="en-US" dirty="0"/>
+          </a:p>
+        </p:txBody>
+      </p:sp>
+    </p:spTree>
+    <p:extLst>
+      <p:ext uri="{BB962C8B-B14F-4D97-AF65-F5344CB8AC3E}">
+        <p14:creationId xmlns:p14="http://schemas.microsoft.com/office/powerpoint/2010/main" val="572505379"/>
       </p:ext>
     </p:extLst>
   </p:cSld>
@@ -4109,29 +4463,18 @@
           </p:cNvSpPr>
           <p:nvPr>
             <p:ph type="title"/>
-            <p:custDataLst>
-              <p:tags r:id="rId1"/>
-            </p:custDataLst>
           </p:nvPr>
         </p:nvSpPr>
         <p:spPr/>
         <p:txBody>
           <a:bodyPr/>
-          <a:lstStyle>
-            <a:lvl1pPr>
-              <a:defRPr>
-                <a:solidFill>
-                  <a:srgbClr val="177EC5"/>
-                </a:solidFill>
-              </a:defRPr>
-            </a:lvl1pPr>
-          </a:lstStyle>
+          <a:lstStyle/>
           <a:p>
             <a:r>
               <a:rPr lang="en-US" smtClean="0"/>
               <a:t>Click to edit Master title style</a:t>
             </a:r>
-            <a:endParaRPr lang="en-US"/>
+            <a:endParaRPr lang="en-US" dirty="0"/>
           </a:p>
         </p:txBody>
       </p:sp>
@@ -4143,17 +4486,9 @@
           </p:cNvSpPr>
           <p:nvPr>
             <p:ph idx="1"/>
-            <p:custDataLst>
-              <p:tags r:id="rId2"/>
-            </p:custDataLst>
-          </p:nvPr>
-        </p:nvSpPr>
-        <p:spPr>
-          <a:xfrm>
-            <a:off x="457200" y="1600200"/>
-            <a:ext cx="8229600" cy="4876800"/>
-          </a:xfrm>
-        </p:spPr>
+          </p:nvPr>
+        </p:nvSpPr>
+        <p:spPr/>
         <p:txBody>
           <a:bodyPr/>
           <a:lstStyle/>
@@ -4191,6 +4526,71 @@
               <a:rPr lang="en-US" smtClean="0"/>
               <a:t>Fifth level</a:t>
             </a:r>
+            <a:endParaRPr lang="en-US" dirty="0"/>
+          </a:p>
+        </p:txBody>
+      </p:sp>
+      <p:sp>
+        <p:nvSpPr>
+          <p:cNvPr id="4" name="Date Placeholder 3"/>
+          <p:cNvSpPr>
+            <a:spLocks noGrp="1"/>
+          </p:cNvSpPr>
+          <p:nvPr>
+            <p:ph type="dt" sz="half" idx="10"/>
+          </p:nvPr>
+        </p:nvSpPr>
+        <p:spPr/>
+        <p:txBody>
+          <a:bodyPr/>
+          <a:lstStyle/>
+          <a:p>
+            <a:fld id="{EB044DB1-568E-4964-A02F-CCDCEAA70EF3}" type="datetimeFigureOut">
+              <a:rPr lang="en-US" smtClean="0"/>
+              <a:t>6/12/2013</a:t>
+            </a:fld>
+            <a:endParaRPr lang="en-US"/>
+          </a:p>
+        </p:txBody>
+      </p:sp>
+      <p:sp>
+        <p:nvSpPr>
+          <p:cNvPr id="5" name="Footer Placeholder 4"/>
+          <p:cNvSpPr>
+            <a:spLocks noGrp="1"/>
+          </p:cNvSpPr>
+          <p:nvPr>
+            <p:ph type="ftr" sz="quarter" idx="11"/>
+          </p:nvPr>
+        </p:nvSpPr>
+        <p:spPr/>
+        <p:txBody>
+          <a:bodyPr/>
+          <a:lstStyle/>
+          <a:p>
+            <a:endParaRPr lang="en-US"/>
+          </a:p>
+        </p:txBody>
+      </p:sp>
+      <p:sp>
+        <p:nvSpPr>
+          <p:cNvPr id="6" name="Slide Number Placeholder 5"/>
+          <p:cNvSpPr>
+            <a:spLocks noGrp="1"/>
+          </p:cNvSpPr>
+          <p:nvPr>
+            <p:ph type="sldNum" sz="quarter" idx="12"/>
+          </p:nvPr>
+        </p:nvSpPr>
+        <p:spPr/>
+        <p:txBody>
+          <a:bodyPr/>
+          <a:lstStyle/>
+          <a:p>
+            <a:fld id="{51CCE939-0FF0-4622-80D4-F7CCF5AA2A8E}" type="slidenum">
+              <a:rPr lang="en-US" smtClean="0"/>
+              <a:t>‹#›</a:t>
+            </a:fld>
             <a:endParaRPr lang="en-US"/>
           </a:p>
         </p:txBody>
@@ -4198,7 +4598,7 @@
     </p:spTree>
     <p:extLst>
       <p:ext uri="{BB962C8B-B14F-4D97-AF65-F5344CB8AC3E}">
-        <p14:creationId xmlns:p14="http://schemas.microsoft.com/office/powerpoint/2010/main" val="2140714215"/>
+        <p14:creationId xmlns:p14="http://schemas.microsoft.com/office/powerpoint/2010/main" val="97730295"/>
       </p:ext>
     </p:extLst>
   </p:cSld>
@@ -4209,7 +4609,7 @@
 </file>
 
 <file path=ppt/slideLayouts/slideLayout3.xml><?xml version="1.0" encoding="utf-8"?>
-<p:sldLayout xmlns:a="http://schemas.openxmlformats.org/drawingml/2006/main" xmlns:r="http://schemas.openxmlformats.org/officeDocument/2006/relationships" xmlns:p="http://schemas.openxmlformats.org/presentationml/2006/main" preserve="1" userDrawn="1">
+<p:sldLayout xmlns:a="http://schemas.openxmlformats.org/drawingml/2006/main" xmlns:r="http://schemas.openxmlformats.org/officeDocument/2006/relationships" xmlns:p="http://schemas.openxmlformats.org/presentationml/2006/main" type="secHead" preserve="1">
   <p:cSld name="Section Header">
     <p:spTree>
       <p:nvGrpSpPr>
@@ -4227,82 +4627,25 @@
       </p:grpSpPr>
       <p:sp>
         <p:nvSpPr>
-          <p:cNvPr id="8" name="Rectangle 7"/>
-          <p:cNvSpPr/>
-          <p:nvPr userDrawn="1">
-            <p:custDataLst>
-              <p:tags r:id="rId1"/>
-            </p:custDataLst>
-          </p:nvPr>
-        </p:nvSpPr>
-        <p:spPr>
-          <a:xfrm flipV="1">
-            <a:off x="0" y="3431458"/>
-            <a:ext cx="9144000" cy="3426542"/>
-          </a:xfrm>
-          <a:prstGeom prst="rect">
-            <a:avLst/>
-          </a:prstGeom>
-          <a:solidFill>
-            <a:srgbClr val="FFFFFF"/>
-          </a:solidFill>
-          <a:ln>
-            <a:noFill/>
-          </a:ln>
-          <a:effectLst/>
-        </p:spPr>
-        <p:style>
-          <a:lnRef idx="1">
-            <a:schemeClr val="accent1"/>
-          </a:lnRef>
-          <a:fillRef idx="3">
-            <a:schemeClr val="accent1"/>
-          </a:fillRef>
-          <a:effectRef idx="2">
-            <a:schemeClr val="accent1"/>
-          </a:effectRef>
-          <a:fontRef idx="minor">
-            <a:schemeClr val="lt1"/>
-          </a:fontRef>
-        </p:style>
-        <p:txBody>
-          <a:bodyPr rtlCol="0" anchor="ctr"/>
-          <a:lstStyle/>
-          <a:p>
-            <a:pPr algn="ctr"/>
-            <a:endParaRPr lang="en-US">
-              <a:solidFill>
-                <a:srgbClr val="0079C1"/>
-              </a:solidFill>
-            </a:endParaRPr>
-          </a:p>
-        </p:txBody>
-      </p:sp>
-      <p:sp>
-        <p:nvSpPr>
           <p:cNvPr id="2" name="Title 1"/>
           <p:cNvSpPr>
             <a:spLocks noGrp="1"/>
           </p:cNvSpPr>
           <p:nvPr>
             <p:ph type="title"/>
-            <p:custDataLst>
-              <p:tags r:id="rId2"/>
-            </p:custDataLst>
           </p:nvPr>
         </p:nvSpPr>
         <p:spPr>
           <a:xfrm>
-            <a:off x="0" y="3431458"/>
-            <a:ext cx="9144000" cy="1362075"/>
+            <a:off x="831850" y="1709738"/>
+            <a:ext cx="10515600" cy="2852737"/>
           </a:xfrm>
-          <a:noFill/>
         </p:spPr>
         <p:txBody>
-          <a:bodyPr anchor="ctr"/>
+          <a:bodyPr anchor="b"/>
           <a:lstStyle>
-            <a:lvl1pPr algn="ctr">
-              <a:defRPr sz="4000" b="0" strike="noStrike" cap="none" normalizeH="0" baseline="0"/>
+            <a:lvl1pPr>
+              <a:defRPr sz="6000"/>
             </a:lvl1pPr>
           </a:lstStyle>
           <a:p>
@@ -4314,44 +4657,194 @@
           </a:p>
         </p:txBody>
       </p:sp>
-      <p:pic>
-        <p:nvPicPr>
-          <p:cNvPr id="7" name="Picture 6" descr="Logo.png"/>
-          <p:cNvPicPr>
-            <a:picLocks noChangeAspect="1"/>
-          </p:cNvPicPr>
-          <p:nvPr userDrawn="1">
-            <p:custDataLst>
-              <p:tags r:id="rId3"/>
-            </p:custDataLst>
-          </p:nvPr>
-        </p:nvPicPr>
-        <p:blipFill>
-          <a:blip r:embed="rId5">
-            <a:extLst>
-              <a:ext uri="{28A0092B-C50C-407E-A947-70E740481C1C}">
-                <a14:useLocalDpi xmlns:a14="http://schemas.microsoft.com/office/drawing/2010/main" val="0"/>
-              </a:ext>
-            </a:extLst>
-          </a:blip>
-          <a:stretch>
-            <a:fillRect/>
-          </a:stretch>
-        </p:blipFill>
+      <p:sp>
+        <p:nvSpPr>
+          <p:cNvPr id="3" name="Text Placeholder 2"/>
+          <p:cNvSpPr>
+            <a:spLocks noGrp="1"/>
+          </p:cNvSpPr>
+          <p:nvPr>
+            <p:ph type="body" idx="1"/>
+          </p:nvPr>
+        </p:nvSpPr>
         <p:spPr>
           <a:xfrm>
-            <a:off x="2439128" y="5382085"/>
-            <a:ext cx="4265744" cy="984403"/>
+            <a:off x="831850" y="4589463"/>
+            <a:ext cx="10515600" cy="1500187"/>
           </a:xfrm>
-          <a:prstGeom prst="rect">
-            <a:avLst/>
-          </a:prstGeom>
         </p:spPr>
-      </p:pic>
+        <p:txBody>
+          <a:bodyPr/>
+          <a:lstStyle>
+            <a:lvl1pPr marL="0" indent="0">
+              <a:buNone/>
+              <a:defRPr sz="2400">
+                <a:solidFill>
+                  <a:schemeClr val="tx1">
+                    <a:tint val="75000"/>
+                  </a:schemeClr>
+                </a:solidFill>
+              </a:defRPr>
+            </a:lvl1pPr>
+            <a:lvl2pPr marL="457200" indent="0">
+              <a:buNone/>
+              <a:defRPr sz="2000">
+                <a:solidFill>
+                  <a:schemeClr val="tx1">
+                    <a:tint val="75000"/>
+                  </a:schemeClr>
+                </a:solidFill>
+              </a:defRPr>
+            </a:lvl2pPr>
+            <a:lvl3pPr marL="914400" indent="0">
+              <a:buNone/>
+              <a:defRPr sz="1800">
+                <a:solidFill>
+                  <a:schemeClr val="tx1">
+                    <a:tint val="75000"/>
+                  </a:schemeClr>
+                </a:solidFill>
+              </a:defRPr>
+            </a:lvl3pPr>
+            <a:lvl4pPr marL="1371600" indent="0">
+              <a:buNone/>
+              <a:defRPr sz="1600">
+                <a:solidFill>
+                  <a:schemeClr val="tx1">
+                    <a:tint val="75000"/>
+                  </a:schemeClr>
+                </a:solidFill>
+              </a:defRPr>
+            </a:lvl4pPr>
+            <a:lvl5pPr marL="1828800" indent="0">
+              <a:buNone/>
+              <a:defRPr sz="1600">
+                <a:solidFill>
+                  <a:schemeClr val="tx1">
+                    <a:tint val="75000"/>
+                  </a:schemeClr>
+                </a:solidFill>
+              </a:defRPr>
+            </a:lvl5pPr>
+            <a:lvl6pPr marL="2286000" indent="0">
+              <a:buNone/>
+              <a:defRPr sz="1600">
+                <a:solidFill>
+                  <a:schemeClr val="tx1">
+                    <a:tint val="75000"/>
+                  </a:schemeClr>
+                </a:solidFill>
+              </a:defRPr>
+            </a:lvl6pPr>
+            <a:lvl7pPr marL="2743200" indent="0">
+              <a:buNone/>
+              <a:defRPr sz="1600">
+                <a:solidFill>
+                  <a:schemeClr val="tx1">
+                    <a:tint val="75000"/>
+                  </a:schemeClr>
+                </a:solidFill>
+              </a:defRPr>
+            </a:lvl7pPr>
+            <a:lvl8pPr marL="3200400" indent="0">
+              <a:buNone/>
+              <a:defRPr sz="1600">
+                <a:solidFill>
+                  <a:schemeClr val="tx1">
+                    <a:tint val="75000"/>
+                  </a:schemeClr>
+                </a:solidFill>
+              </a:defRPr>
+            </a:lvl8pPr>
+            <a:lvl9pPr marL="3657600" indent="0">
+              <a:buNone/>
+              <a:defRPr sz="1600">
+                <a:solidFill>
+                  <a:schemeClr val="tx1">
+                    <a:tint val="75000"/>
+                  </a:schemeClr>
+                </a:solidFill>
+              </a:defRPr>
+            </a:lvl9pPr>
+          </a:lstStyle>
+          <a:p>
+            <a:pPr lvl="0"/>
+            <a:r>
+              <a:rPr lang="en-US" smtClean="0"/>
+              <a:t>Click to edit Master text styles</a:t>
+            </a:r>
+          </a:p>
+        </p:txBody>
+      </p:sp>
+      <p:sp>
+        <p:nvSpPr>
+          <p:cNvPr id="4" name="Date Placeholder 3"/>
+          <p:cNvSpPr>
+            <a:spLocks noGrp="1"/>
+          </p:cNvSpPr>
+          <p:nvPr>
+            <p:ph type="dt" sz="half" idx="10"/>
+          </p:nvPr>
+        </p:nvSpPr>
+        <p:spPr/>
+        <p:txBody>
+          <a:bodyPr/>
+          <a:lstStyle/>
+          <a:p>
+            <a:fld id="{EB044DB1-568E-4964-A02F-CCDCEAA70EF3}" type="datetimeFigureOut">
+              <a:rPr lang="en-US" smtClean="0"/>
+              <a:t>6/12/2013</a:t>
+            </a:fld>
+            <a:endParaRPr lang="en-US"/>
+          </a:p>
+        </p:txBody>
+      </p:sp>
+      <p:sp>
+        <p:nvSpPr>
+          <p:cNvPr id="5" name="Footer Placeholder 4"/>
+          <p:cNvSpPr>
+            <a:spLocks noGrp="1"/>
+          </p:cNvSpPr>
+          <p:nvPr>
+            <p:ph type="ftr" sz="quarter" idx="11"/>
+          </p:nvPr>
+        </p:nvSpPr>
+        <p:spPr/>
+        <p:txBody>
+          <a:bodyPr/>
+          <a:lstStyle/>
+          <a:p>
+            <a:endParaRPr lang="en-US"/>
+          </a:p>
+        </p:txBody>
+      </p:sp>
+      <p:sp>
+        <p:nvSpPr>
+          <p:cNvPr id="6" name="Slide Number Placeholder 5"/>
+          <p:cNvSpPr>
+            <a:spLocks noGrp="1"/>
+          </p:cNvSpPr>
+          <p:nvPr>
+            <p:ph type="sldNum" sz="quarter" idx="12"/>
+          </p:nvPr>
+        </p:nvSpPr>
+        <p:spPr/>
+        <p:txBody>
+          <a:bodyPr/>
+          <a:lstStyle/>
+          <a:p>
+            <a:fld id="{51CCE939-0FF0-4622-80D4-F7CCF5AA2A8E}" type="slidenum">
+              <a:rPr lang="en-US" smtClean="0"/>
+              <a:t>‹#›</a:t>
+            </a:fld>
+            <a:endParaRPr lang="en-US"/>
+          </a:p>
+        </p:txBody>
+      </p:sp>
     </p:spTree>
     <p:extLst>
       <p:ext uri="{BB962C8B-B14F-4D97-AF65-F5344CB8AC3E}">
-        <p14:creationId xmlns:p14="http://schemas.microsoft.com/office/powerpoint/2010/main" val="876361898"/>
+        <p14:creationId xmlns:p14="http://schemas.microsoft.com/office/powerpoint/2010/main" val="3588386111"/>
       </p:ext>
     </p:extLst>
   </p:cSld>
@@ -4386,9 +4879,6 @@
           </p:cNvSpPr>
           <p:nvPr>
             <p:ph type="title"/>
-            <p:custDataLst>
-              <p:tags r:id="rId1"/>
-            </p:custDataLst>
           </p:nvPr>
         </p:nvSpPr>
         <p:spPr/>
@@ -4400,7 +4890,7 @@
               <a:rPr lang="en-US" smtClean="0"/>
               <a:t>Click to edit Master title style</a:t>
             </a:r>
-            <a:endParaRPr lang="en-US"/>
+            <a:endParaRPr lang="en-US" dirty="0"/>
           </a:p>
         </p:txBody>
       </p:sp>
@@ -4412,48 +4902,17 @@
           </p:cNvSpPr>
           <p:nvPr>
             <p:ph sz="half" idx="1"/>
-            <p:custDataLst>
-              <p:tags r:id="rId2"/>
-            </p:custDataLst>
           </p:nvPr>
         </p:nvSpPr>
         <p:spPr>
           <a:xfrm>
-            <a:off x="457200" y="1600200"/>
-            <a:ext cx="4038600" cy="4868333"/>
+            <a:off x="838200" y="1825625"/>
+            <a:ext cx="5181600" cy="4351338"/>
           </a:xfrm>
         </p:spPr>
         <p:txBody>
           <a:bodyPr/>
-          <a:lstStyle>
-            <a:lvl1pPr>
-              <a:defRPr sz="2800"/>
-            </a:lvl1pPr>
-            <a:lvl2pPr>
-              <a:defRPr sz="2400"/>
-            </a:lvl2pPr>
-            <a:lvl3pPr>
-              <a:defRPr sz="2000"/>
-            </a:lvl3pPr>
-            <a:lvl4pPr>
-              <a:defRPr sz="1800"/>
-            </a:lvl4pPr>
-            <a:lvl5pPr>
-              <a:defRPr sz="1800"/>
-            </a:lvl5pPr>
-            <a:lvl6pPr>
-              <a:defRPr sz="1800"/>
-            </a:lvl6pPr>
-            <a:lvl7pPr>
-              <a:defRPr sz="1800"/>
-            </a:lvl7pPr>
-            <a:lvl8pPr>
-              <a:defRPr sz="1800"/>
-            </a:lvl8pPr>
-            <a:lvl9pPr>
-              <a:defRPr sz="1800"/>
-            </a:lvl9pPr>
-          </a:lstStyle>
+          <a:lstStyle/>
           <a:p>
             <a:pPr lvl="0"/>
             <a:r>
@@ -4488,7 +4947,7 @@
               <a:rPr lang="en-US" smtClean="0"/>
               <a:t>Fifth level</a:t>
             </a:r>
-            <a:endParaRPr lang="en-US"/>
+            <a:endParaRPr lang="en-US" dirty="0"/>
           </a:p>
         </p:txBody>
       </p:sp>
@@ -4500,48 +4959,17 @@
           </p:cNvSpPr>
           <p:nvPr>
             <p:ph sz="half" idx="2"/>
-            <p:custDataLst>
-              <p:tags r:id="rId3"/>
-            </p:custDataLst>
           </p:nvPr>
         </p:nvSpPr>
         <p:spPr>
           <a:xfrm>
-            <a:off x="4648200" y="1600200"/>
-            <a:ext cx="4038600" cy="4868333"/>
+            <a:off x="6172200" y="1825625"/>
+            <a:ext cx="5181600" cy="4351338"/>
           </a:xfrm>
         </p:spPr>
         <p:txBody>
           <a:bodyPr/>
-          <a:lstStyle>
-            <a:lvl1pPr>
-              <a:defRPr sz="2800"/>
-            </a:lvl1pPr>
-            <a:lvl2pPr>
-              <a:defRPr sz="2400"/>
-            </a:lvl2pPr>
-            <a:lvl3pPr>
-              <a:defRPr sz="2000"/>
-            </a:lvl3pPr>
-            <a:lvl4pPr>
-              <a:defRPr sz="1800"/>
-            </a:lvl4pPr>
-            <a:lvl5pPr>
-              <a:defRPr sz="1800"/>
-            </a:lvl5pPr>
-            <a:lvl6pPr>
-              <a:defRPr sz="1800"/>
-            </a:lvl6pPr>
-            <a:lvl7pPr>
-              <a:defRPr sz="1800"/>
-            </a:lvl7pPr>
-            <a:lvl8pPr>
-              <a:defRPr sz="1800"/>
-            </a:lvl8pPr>
-            <a:lvl9pPr>
-              <a:defRPr sz="1800"/>
-            </a:lvl9pPr>
-          </a:lstStyle>
+          <a:lstStyle/>
           <a:p>
             <a:pPr lvl="0"/>
             <a:r>
@@ -4576,6 +5004,71 @@
               <a:rPr lang="en-US" smtClean="0"/>
               <a:t>Fifth level</a:t>
             </a:r>
+            <a:endParaRPr lang="en-US" dirty="0"/>
+          </a:p>
+        </p:txBody>
+      </p:sp>
+      <p:sp>
+        <p:nvSpPr>
+          <p:cNvPr id="5" name="Date Placeholder 4"/>
+          <p:cNvSpPr>
+            <a:spLocks noGrp="1"/>
+          </p:cNvSpPr>
+          <p:nvPr>
+            <p:ph type="dt" sz="half" idx="10"/>
+          </p:nvPr>
+        </p:nvSpPr>
+        <p:spPr/>
+        <p:txBody>
+          <a:bodyPr/>
+          <a:lstStyle/>
+          <a:p>
+            <a:fld id="{EB044DB1-568E-4964-A02F-CCDCEAA70EF3}" type="datetimeFigureOut">
+              <a:rPr lang="en-US" smtClean="0"/>
+              <a:t>6/12/2013</a:t>
+            </a:fld>
+            <a:endParaRPr lang="en-US"/>
+          </a:p>
+        </p:txBody>
+      </p:sp>
+      <p:sp>
+        <p:nvSpPr>
+          <p:cNvPr id="6" name="Footer Placeholder 5"/>
+          <p:cNvSpPr>
+            <a:spLocks noGrp="1"/>
+          </p:cNvSpPr>
+          <p:nvPr>
+            <p:ph type="ftr" sz="quarter" idx="11"/>
+          </p:nvPr>
+        </p:nvSpPr>
+        <p:spPr/>
+        <p:txBody>
+          <a:bodyPr/>
+          <a:lstStyle/>
+          <a:p>
+            <a:endParaRPr lang="en-US"/>
+          </a:p>
+        </p:txBody>
+      </p:sp>
+      <p:sp>
+        <p:nvSpPr>
+          <p:cNvPr id="7" name="Slide Number Placeholder 6"/>
+          <p:cNvSpPr>
+            <a:spLocks noGrp="1"/>
+          </p:cNvSpPr>
+          <p:nvPr>
+            <p:ph type="sldNum" sz="quarter" idx="12"/>
+          </p:nvPr>
+        </p:nvSpPr>
+        <p:spPr/>
+        <p:txBody>
+          <a:bodyPr/>
+          <a:lstStyle/>
+          <a:p>
+            <a:fld id="{51CCE939-0FF0-4622-80D4-F7CCF5AA2A8E}" type="slidenum">
+              <a:rPr lang="en-US" smtClean="0"/>
+              <a:t>‹#›</a:t>
+            </a:fld>
             <a:endParaRPr lang="en-US"/>
           </a:p>
         </p:txBody>
@@ -4583,7 +5076,7 @@
     </p:spTree>
     <p:extLst>
       <p:ext uri="{BB962C8B-B14F-4D97-AF65-F5344CB8AC3E}">
-        <p14:creationId xmlns:p14="http://schemas.microsoft.com/office/powerpoint/2010/main" val="1068917115"/>
+        <p14:creationId xmlns:p14="http://schemas.microsoft.com/office/powerpoint/2010/main" val="2098524964"/>
       </p:ext>
     </p:extLst>
   </p:cSld>
@@ -4618,25 +5111,23 @@
           </p:cNvSpPr>
           <p:nvPr>
             <p:ph type="title"/>
-            <p:custDataLst>
-              <p:tags r:id="rId1"/>
-            </p:custDataLst>
-          </p:nvPr>
-        </p:nvSpPr>
-        <p:spPr/>
+          </p:nvPr>
+        </p:nvSpPr>
+        <p:spPr>
+          <a:xfrm>
+            <a:off x="839788" y="365125"/>
+            <a:ext cx="10515600" cy="1325563"/>
+          </a:xfrm>
+        </p:spPr>
         <p:txBody>
           <a:bodyPr/>
-          <a:lstStyle>
-            <a:lvl1pPr>
-              <a:defRPr/>
-            </a:lvl1pPr>
-          </a:lstStyle>
+          <a:lstStyle/>
           <a:p>
             <a:r>
               <a:rPr lang="en-US" smtClean="0"/>
               <a:t>Click to edit Master title style</a:t>
             </a:r>
-            <a:endParaRPr lang="en-US"/>
+            <a:endParaRPr lang="en-US" dirty="0"/>
           </a:p>
         </p:txBody>
       </p:sp>
@@ -4648,15 +5139,12 @@
           </p:cNvSpPr>
           <p:nvPr>
             <p:ph type="body" idx="1"/>
-            <p:custDataLst>
-              <p:tags r:id="rId2"/>
-            </p:custDataLst>
           </p:nvPr>
         </p:nvSpPr>
         <p:spPr>
           <a:xfrm>
-            <a:off x="457200" y="1535113"/>
-            <a:ext cx="4040188" cy="639762"/>
+            <a:off x="839788" y="1681163"/>
+            <a:ext cx="5157787" cy="823912"/>
           </a:xfrm>
         </p:spPr>
         <p:txBody>
@@ -4716,48 +5204,17 @@
           </p:cNvSpPr>
           <p:nvPr>
             <p:ph sz="half" idx="2"/>
-            <p:custDataLst>
-              <p:tags r:id="rId3"/>
-            </p:custDataLst>
           </p:nvPr>
         </p:nvSpPr>
         <p:spPr>
           <a:xfrm>
-            <a:off x="457200" y="2174875"/>
-            <a:ext cx="4040188" cy="4319058"/>
+            <a:off x="839788" y="2505075"/>
+            <a:ext cx="5157787" cy="3684588"/>
           </a:xfrm>
         </p:spPr>
         <p:txBody>
           <a:bodyPr/>
-          <a:lstStyle>
-            <a:lvl1pPr>
-              <a:defRPr sz="2400"/>
-            </a:lvl1pPr>
-            <a:lvl2pPr>
-              <a:defRPr sz="2000"/>
-            </a:lvl2pPr>
-            <a:lvl3pPr>
-              <a:defRPr sz="1800"/>
-            </a:lvl3pPr>
-            <a:lvl4pPr>
-              <a:defRPr sz="1600"/>
-            </a:lvl4pPr>
-            <a:lvl5pPr>
-              <a:defRPr sz="1600"/>
-            </a:lvl5pPr>
-            <a:lvl6pPr>
-              <a:defRPr sz="1600"/>
-            </a:lvl6pPr>
-            <a:lvl7pPr>
-              <a:defRPr sz="1600"/>
-            </a:lvl7pPr>
-            <a:lvl8pPr>
-              <a:defRPr sz="1600"/>
-            </a:lvl8pPr>
-            <a:lvl9pPr>
-              <a:defRPr sz="1600"/>
-            </a:lvl9pPr>
-          </a:lstStyle>
+          <a:lstStyle/>
           <a:p>
             <a:pPr lvl="0"/>
             <a:r>
@@ -4792,7 +5249,7 @@
               <a:rPr lang="en-US" smtClean="0"/>
               <a:t>Fifth level</a:t>
             </a:r>
-            <a:endParaRPr lang="en-US"/>
+            <a:endParaRPr lang="en-US" dirty="0"/>
           </a:p>
         </p:txBody>
       </p:sp>
@@ -4804,15 +5261,12 @@
           </p:cNvSpPr>
           <p:nvPr>
             <p:ph type="body" sz="quarter" idx="3"/>
-            <p:custDataLst>
-              <p:tags r:id="rId4"/>
-            </p:custDataLst>
           </p:nvPr>
         </p:nvSpPr>
         <p:spPr>
           <a:xfrm>
-            <a:off x="4645025" y="1535113"/>
-            <a:ext cx="4041775" cy="639762"/>
+            <a:off x="6172200" y="1681163"/>
+            <a:ext cx="5183188" cy="823912"/>
           </a:xfrm>
         </p:spPr>
         <p:txBody>
@@ -4872,48 +5326,17 @@
           </p:cNvSpPr>
           <p:nvPr>
             <p:ph sz="quarter" idx="4"/>
-            <p:custDataLst>
-              <p:tags r:id="rId5"/>
-            </p:custDataLst>
           </p:nvPr>
         </p:nvSpPr>
         <p:spPr>
           <a:xfrm>
-            <a:off x="4645025" y="2174875"/>
-            <a:ext cx="4041775" cy="4319058"/>
+            <a:off x="6172200" y="2505075"/>
+            <a:ext cx="5183188" cy="3684588"/>
           </a:xfrm>
         </p:spPr>
         <p:txBody>
           <a:bodyPr/>
-          <a:lstStyle>
-            <a:lvl1pPr>
-              <a:defRPr sz="2400"/>
-            </a:lvl1pPr>
-            <a:lvl2pPr>
-              <a:defRPr sz="2000"/>
-            </a:lvl2pPr>
-            <a:lvl3pPr>
-              <a:defRPr sz="1800"/>
-            </a:lvl3pPr>
-            <a:lvl4pPr>
-              <a:defRPr sz="1600"/>
-            </a:lvl4pPr>
-            <a:lvl5pPr>
-              <a:defRPr sz="1600"/>
-            </a:lvl5pPr>
-            <a:lvl6pPr>
-              <a:defRPr sz="1600"/>
-            </a:lvl6pPr>
-            <a:lvl7pPr>
-              <a:defRPr sz="1600"/>
-            </a:lvl7pPr>
-            <a:lvl8pPr>
-              <a:defRPr sz="1600"/>
-            </a:lvl8pPr>
-            <a:lvl9pPr>
-              <a:defRPr sz="1600"/>
-            </a:lvl9pPr>
-          </a:lstStyle>
+          <a:lstStyle/>
           <a:p>
             <a:pPr lvl="0"/>
             <a:r>
@@ -4948,6 +5371,71 @@
               <a:rPr lang="en-US" smtClean="0"/>
               <a:t>Fifth level</a:t>
             </a:r>
+            <a:endParaRPr lang="en-US" dirty="0"/>
+          </a:p>
+        </p:txBody>
+      </p:sp>
+      <p:sp>
+        <p:nvSpPr>
+          <p:cNvPr id="7" name="Date Placeholder 6"/>
+          <p:cNvSpPr>
+            <a:spLocks noGrp="1"/>
+          </p:cNvSpPr>
+          <p:nvPr>
+            <p:ph type="dt" sz="half" idx="10"/>
+          </p:nvPr>
+        </p:nvSpPr>
+        <p:spPr/>
+        <p:txBody>
+          <a:bodyPr/>
+          <a:lstStyle/>
+          <a:p>
+            <a:fld id="{EB044DB1-568E-4964-A02F-CCDCEAA70EF3}" type="datetimeFigureOut">
+              <a:rPr lang="en-US" smtClean="0"/>
+              <a:t>6/12/2013</a:t>
+            </a:fld>
+            <a:endParaRPr lang="en-US"/>
+          </a:p>
+        </p:txBody>
+      </p:sp>
+      <p:sp>
+        <p:nvSpPr>
+          <p:cNvPr id="8" name="Footer Placeholder 7"/>
+          <p:cNvSpPr>
+            <a:spLocks noGrp="1"/>
+          </p:cNvSpPr>
+          <p:nvPr>
+            <p:ph type="ftr" sz="quarter" idx="11"/>
+          </p:nvPr>
+        </p:nvSpPr>
+        <p:spPr/>
+        <p:txBody>
+          <a:bodyPr/>
+          <a:lstStyle/>
+          <a:p>
+            <a:endParaRPr lang="en-US"/>
+          </a:p>
+        </p:txBody>
+      </p:sp>
+      <p:sp>
+        <p:nvSpPr>
+          <p:cNvPr id="9" name="Slide Number Placeholder 8"/>
+          <p:cNvSpPr>
+            <a:spLocks noGrp="1"/>
+          </p:cNvSpPr>
+          <p:nvPr>
+            <p:ph type="sldNum" sz="quarter" idx="12"/>
+          </p:nvPr>
+        </p:nvSpPr>
+        <p:spPr/>
+        <p:txBody>
+          <a:bodyPr/>
+          <a:lstStyle/>
+          <a:p>
+            <a:fld id="{51CCE939-0FF0-4622-80D4-F7CCF5AA2A8E}" type="slidenum">
+              <a:rPr lang="en-US" smtClean="0"/>
+              <a:t>‹#›</a:t>
+            </a:fld>
             <a:endParaRPr lang="en-US"/>
           </a:p>
         </p:txBody>
@@ -4955,7 +5443,7 @@
     </p:spTree>
     <p:extLst>
       <p:ext uri="{BB962C8B-B14F-4D97-AF65-F5344CB8AC3E}">
-        <p14:creationId xmlns:p14="http://schemas.microsoft.com/office/powerpoint/2010/main" val="1298122151"/>
+        <p14:creationId xmlns:p14="http://schemas.microsoft.com/office/powerpoint/2010/main" val="1649892155"/>
       </p:ext>
     </p:extLst>
   </p:cSld>
@@ -4990,9 +5478,6 @@
           </p:cNvSpPr>
           <p:nvPr>
             <p:ph type="title"/>
-            <p:custDataLst>
-              <p:tags r:id="rId1"/>
-            </p:custDataLst>
           </p:nvPr>
         </p:nvSpPr>
         <p:spPr/>
@@ -5004,6 +5489,71 @@
               <a:rPr lang="en-US" smtClean="0"/>
               <a:t>Click to edit Master title style</a:t>
             </a:r>
+            <a:endParaRPr lang="en-US" dirty="0"/>
+          </a:p>
+        </p:txBody>
+      </p:sp>
+      <p:sp>
+        <p:nvSpPr>
+          <p:cNvPr id="3" name="Date Placeholder 2"/>
+          <p:cNvSpPr>
+            <a:spLocks noGrp="1"/>
+          </p:cNvSpPr>
+          <p:nvPr>
+            <p:ph type="dt" sz="half" idx="10"/>
+          </p:nvPr>
+        </p:nvSpPr>
+        <p:spPr/>
+        <p:txBody>
+          <a:bodyPr/>
+          <a:lstStyle/>
+          <a:p>
+            <a:fld id="{EB044DB1-568E-4964-A02F-CCDCEAA70EF3}" type="datetimeFigureOut">
+              <a:rPr lang="en-US" smtClean="0"/>
+              <a:t>6/12/2013</a:t>
+            </a:fld>
+            <a:endParaRPr lang="en-US"/>
+          </a:p>
+        </p:txBody>
+      </p:sp>
+      <p:sp>
+        <p:nvSpPr>
+          <p:cNvPr id="4" name="Footer Placeholder 3"/>
+          <p:cNvSpPr>
+            <a:spLocks noGrp="1"/>
+          </p:cNvSpPr>
+          <p:nvPr>
+            <p:ph type="ftr" sz="quarter" idx="11"/>
+          </p:nvPr>
+        </p:nvSpPr>
+        <p:spPr/>
+        <p:txBody>
+          <a:bodyPr/>
+          <a:lstStyle/>
+          <a:p>
+            <a:endParaRPr lang="en-US"/>
+          </a:p>
+        </p:txBody>
+      </p:sp>
+      <p:sp>
+        <p:nvSpPr>
+          <p:cNvPr id="5" name="Slide Number Placeholder 4"/>
+          <p:cNvSpPr>
+            <a:spLocks noGrp="1"/>
+          </p:cNvSpPr>
+          <p:nvPr>
+            <p:ph type="sldNum" sz="quarter" idx="12"/>
+          </p:nvPr>
+        </p:nvSpPr>
+        <p:spPr/>
+        <p:txBody>
+          <a:bodyPr/>
+          <a:lstStyle/>
+          <a:p>
+            <a:fld id="{51CCE939-0FF0-4622-80D4-F7CCF5AA2A8E}" type="slidenum">
+              <a:rPr lang="en-US" smtClean="0"/>
+              <a:t>‹#›</a:t>
+            </a:fld>
             <a:endParaRPr lang="en-US"/>
           </a:p>
         </p:txBody>
@@ -5011,7 +5561,7 @@
     </p:spTree>
     <p:extLst>
       <p:ext uri="{BB962C8B-B14F-4D97-AF65-F5344CB8AC3E}">
-        <p14:creationId xmlns:p14="http://schemas.microsoft.com/office/powerpoint/2010/main" val="1857007758"/>
+        <p14:creationId xmlns:p14="http://schemas.microsoft.com/office/powerpoint/2010/main" val="4097795230"/>
       </p:ext>
     </p:extLst>
   </p:cSld>
@@ -5038,10 +5588,75 @@
           <a:chExt cx="0" cy="0"/>
         </a:xfrm>
       </p:grpSpPr>
+      <p:sp>
+        <p:nvSpPr>
+          <p:cNvPr id="2" name="Date Placeholder 1"/>
+          <p:cNvSpPr>
+            <a:spLocks noGrp="1"/>
+          </p:cNvSpPr>
+          <p:nvPr>
+            <p:ph type="dt" sz="half" idx="10"/>
+          </p:nvPr>
+        </p:nvSpPr>
+        <p:spPr/>
+        <p:txBody>
+          <a:bodyPr/>
+          <a:lstStyle/>
+          <a:p>
+            <a:fld id="{EB044DB1-568E-4964-A02F-CCDCEAA70EF3}" type="datetimeFigureOut">
+              <a:rPr lang="en-US" smtClean="0"/>
+              <a:t>6/12/2013</a:t>
+            </a:fld>
+            <a:endParaRPr lang="en-US"/>
+          </a:p>
+        </p:txBody>
+      </p:sp>
+      <p:sp>
+        <p:nvSpPr>
+          <p:cNvPr id="3" name="Footer Placeholder 2"/>
+          <p:cNvSpPr>
+            <a:spLocks noGrp="1"/>
+          </p:cNvSpPr>
+          <p:nvPr>
+            <p:ph type="ftr" sz="quarter" idx="11"/>
+          </p:nvPr>
+        </p:nvSpPr>
+        <p:spPr/>
+        <p:txBody>
+          <a:bodyPr/>
+          <a:lstStyle/>
+          <a:p>
+            <a:endParaRPr lang="en-US"/>
+          </a:p>
+        </p:txBody>
+      </p:sp>
+      <p:sp>
+        <p:nvSpPr>
+          <p:cNvPr id="4" name="Slide Number Placeholder 3"/>
+          <p:cNvSpPr>
+            <a:spLocks noGrp="1"/>
+          </p:cNvSpPr>
+          <p:nvPr>
+            <p:ph type="sldNum" sz="quarter" idx="12"/>
+          </p:nvPr>
+        </p:nvSpPr>
+        <p:spPr/>
+        <p:txBody>
+          <a:bodyPr/>
+          <a:lstStyle/>
+          <a:p>
+            <a:fld id="{51CCE939-0FF0-4622-80D4-F7CCF5AA2A8E}" type="slidenum">
+              <a:rPr lang="en-US" smtClean="0"/>
+              <a:t>‹#›</a:t>
+            </a:fld>
+            <a:endParaRPr lang="en-US"/>
+          </a:p>
+        </p:txBody>
+      </p:sp>
     </p:spTree>
     <p:extLst>
       <p:ext uri="{BB962C8B-B14F-4D97-AF65-F5344CB8AC3E}">
-        <p14:creationId xmlns:p14="http://schemas.microsoft.com/office/powerpoint/2010/main" val="1278555131"/>
+        <p14:creationId xmlns:p14="http://schemas.microsoft.com/office/powerpoint/2010/main" val="3645575635"/>
       </p:ext>
     </p:extLst>
   </p:cSld>
@@ -5076,22 +5691,19 @@
           </p:cNvSpPr>
           <p:nvPr>
             <p:ph type="title"/>
-            <p:custDataLst>
-              <p:tags r:id="rId1"/>
-            </p:custDataLst>
           </p:nvPr>
         </p:nvSpPr>
         <p:spPr>
           <a:xfrm>
-            <a:off x="457200" y="273050"/>
-            <a:ext cx="3008313" cy="1162050"/>
+            <a:off x="839788" y="457200"/>
+            <a:ext cx="3932237" cy="1600200"/>
           </a:xfrm>
         </p:spPr>
         <p:txBody>
           <a:bodyPr anchor="b"/>
           <a:lstStyle>
-            <a:lvl1pPr algn="l">
-              <a:defRPr sz="2000" b="1"/>
+            <a:lvl1pPr>
+              <a:defRPr sz="3200"/>
             </a:lvl1pPr>
           </a:lstStyle>
           <a:p>
@@ -5099,7 +5711,7 @@
               <a:rPr lang="en-US" smtClean="0"/>
               <a:t>Click to edit Master title style</a:t>
             </a:r>
-            <a:endParaRPr lang="en-US"/>
+            <a:endParaRPr lang="en-US" dirty="0"/>
           </a:p>
         </p:txBody>
       </p:sp>
@@ -5111,15 +5723,12 @@
           </p:cNvSpPr>
           <p:nvPr>
             <p:ph idx="1"/>
-            <p:custDataLst>
-              <p:tags r:id="rId2"/>
-            </p:custDataLst>
           </p:nvPr>
         </p:nvSpPr>
         <p:spPr>
           <a:xfrm>
-            <a:off x="3575050" y="273050"/>
-            <a:ext cx="5111750" cy="6220883"/>
+            <a:off x="5183188" y="987425"/>
+            <a:ext cx="6172200" cy="4873625"/>
           </a:xfrm>
         </p:spPr>
         <p:txBody>
@@ -5187,7 +5796,7 @@
               <a:rPr lang="en-US" smtClean="0"/>
               <a:t>Fifth level</a:t>
             </a:r>
-            <a:endParaRPr lang="en-US"/>
+            <a:endParaRPr lang="en-US" dirty="0"/>
           </a:p>
         </p:txBody>
       </p:sp>
@@ -5199,15 +5808,12 @@
           </p:cNvSpPr>
           <p:nvPr>
             <p:ph type="body" sz="half" idx="2"/>
-            <p:custDataLst>
-              <p:tags r:id="rId3"/>
-            </p:custDataLst>
           </p:nvPr>
         </p:nvSpPr>
         <p:spPr>
           <a:xfrm>
-            <a:off x="457200" y="1435100"/>
-            <a:ext cx="3008313" cy="5058833"/>
+            <a:off x="839788" y="2057400"/>
+            <a:ext cx="3932237" cy="3811588"/>
           </a:xfrm>
         </p:spPr>
         <p:txBody>
@@ -5215,39 +5821,39 @@
           <a:lstStyle>
             <a:lvl1pPr marL="0" indent="0">
               <a:buNone/>
-              <a:defRPr sz="1400"/>
+              <a:defRPr sz="1600"/>
             </a:lvl1pPr>
             <a:lvl2pPr marL="457200" indent="0">
               <a:buNone/>
-              <a:defRPr sz="1200"/>
+              <a:defRPr sz="1400"/>
             </a:lvl2pPr>
             <a:lvl3pPr marL="914400" indent="0">
               <a:buNone/>
-              <a:defRPr sz="1000"/>
+              <a:defRPr sz="1200"/>
             </a:lvl3pPr>
             <a:lvl4pPr marL="1371600" indent="0">
               <a:buNone/>
-              <a:defRPr sz="900"/>
+              <a:defRPr sz="1000"/>
             </a:lvl4pPr>
             <a:lvl5pPr marL="1828800" indent="0">
               <a:buNone/>
-              <a:defRPr sz="900"/>
+              <a:defRPr sz="1000"/>
             </a:lvl5pPr>
             <a:lvl6pPr marL="2286000" indent="0">
               <a:buNone/>
-              <a:defRPr sz="900"/>
+              <a:defRPr sz="1000"/>
             </a:lvl6pPr>
             <a:lvl7pPr marL="2743200" indent="0">
               <a:buNone/>
-              <a:defRPr sz="900"/>
+              <a:defRPr sz="1000"/>
             </a:lvl7pPr>
             <a:lvl8pPr marL="3200400" indent="0">
               <a:buNone/>
-              <a:defRPr sz="900"/>
+              <a:defRPr sz="1000"/>
             </a:lvl8pPr>
             <a:lvl9pPr marL="3657600" indent="0">
               <a:buNone/>
-              <a:defRPr sz="900"/>
+              <a:defRPr sz="1000"/>
             </a:lvl9pPr>
           </a:lstStyle>
           <a:p>
@@ -5256,13 +5862,78 @@
               <a:rPr lang="en-US" smtClean="0"/>
               <a:t>Click to edit Master text styles</a:t>
             </a:r>
+          </a:p>
+        </p:txBody>
+      </p:sp>
+      <p:sp>
+        <p:nvSpPr>
+          <p:cNvPr id="5" name="Date Placeholder 4"/>
+          <p:cNvSpPr>
+            <a:spLocks noGrp="1"/>
+          </p:cNvSpPr>
+          <p:nvPr>
+            <p:ph type="dt" sz="half" idx="10"/>
+          </p:nvPr>
+        </p:nvSpPr>
+        <p:spPr/>
+        <p:txBody>
+          <a:bodyPr/>
+          <a:lstStyle/>
+          <a:p>
+            <a:fld id="{EB044DB1-568E-4964-A02F-CCDCEAA70EF3}" type="datetimeFigureOut">
+              <a:rPr lang="en-US" smtClean="0"/>
+              <a:t>6/12/2013</a:t>
+            </a:fld>
+            <a:endParaRPr lang="en-US"/>
+          </a:p>
+        </p:txBody>
+      </p:sp>
+      <p:sp>
+        <p:nvSpPr>
+          <p:cNvPr id="6" name="Footer Placeholder 5"/>
+          <p:cNvSpPr>
+            <a:spLocks noGrp="1"/>
+          </p:cNvSpPr>
+          <p:nvPr>
+            <p:ph type="ftr" sz="quarter" idx="11"/>
+          </p:nvPr>
+        </p:nvSpPr>
+        <p:spPr/>
+        <p:txBody>
+          <a:bodyPr/>
+          <a:lstStyle/>
+          <a:p>
+            <a:endParaRPr lang="en-US"/>
+          </a:p>
+        </p:txBody>
+      </p:sp>
+      <p:sp>
+        <p:nvSpPr>
+          <p:cNvPr id="7" name="Slide Number Placeholder 6"/>
+          <p:cNvSpPr>
+            <a:spLocks noGrp="1"/>
+          </p:cNvSpPr>
+          <p:nvPr>
+            <p:ph type="sldNum" sz="quarter" idx="12"/>
+          </p:nvPr>
+        </p:nvSpPr>
+        <p:spPr/>
+        <p:txBody>
+          <a:bodyPr/>
+          <a:lstStyle/>
+          <a:p>
+            <a:fld id="{51CCE939-0FF0-4622-80D4-F7CCF5AA2A8E}" type="slidenum">
+              <a:rPr lang="en-US" smtClean="0"/>
+              <a:t>‹#›</a:t>
+            </a:fld>
+            <a:endParaRPr lang="en-US"/>
           </a:p>
         </p:txBody>
       </p:sp>
     </p:spTree>
     <p:extLst>
       <p:ext uri="{BB962C8B-B14F-4D97-AF65-F5344CB8AC3E}">
-        <p14:creationId xmlns:p14="http://schemas.microsoft.com/office/powerpoint/2010/main" val="3443721936"/>
+        <p14:creationId xmlns:p14="http://schemas.microsoft.com/office/powerpoint/2010/main" val="3163775482"/>
       </p:ext>
     </p:extLst>
   </p:cSld>
@@ -5297,22 +5968,19 @@
           </p:cNvSpPr>
           <p:nvPr>
             <p:ph type="title"/>
-            <p:custDataLst>
-              <p:tags r:id="rId1"/>
-            </p:custDataLst>
           </p:nvPr>
         </p:nvSpPr>
         <p:spPr>
           <a:xfrm>
-            <a:off x="1792288" y="4800600"/>
-            <a:ext cx="5486400" cy="566738"/>
+            <a:off x="839788" y="457200"/>
+            <a:ext cx="3932237" cy="1600200"/>
           </a:xfrm>
         </p:spPr>
         <p:txBody>
           <a:bodyPr anchor="b"/>
           <a:lstStyle>
-            <a:lvl1pPr algn="l">
-              <a:defRPr sz="2000" b="1"/>
+            <a:lvl1pPr>
+              <a:defRPr sz="3200"/>
             </a:lvl1pPr>
           </a:lstStyle>
           <a:p>
@@ -5320,7 +5988,7 @@
               <a:rPr lang="en-US" smtClean="0"/>
               <a:t>Click to edit Master title style</a:t>
             </a:r>
-            <a:endParaRPr lang="en-US"/>
+            <a:endParaRPr lang="en-US" dirty="0"/>
           </a:p>
         </p:txBody>
       </p:sp>
@@ -5328,23 +5996,20 @@
         <p:nvSpPr>
           <p:cNvPr id="3" name="Picture Placeholder 2"/>
           <p:cNvSpPr>
-            <a:spLocks noGrp="1"/>
+            <a:spLocks noGrp="1" noChangeAspect="1"/>
           </p:cNvSpPr>
           <p:nvPr>
             <p:ph type="pic" idx="1"/>
-            <p:custDataLst>
-              <p:tags r:id="rId2"/>
-            </p:custDataLst>
           </p:nvPr>
         </p:nvSpPr>
         <p:spPr>
           <a:xfrm>
-            <a:off x="1792288" y="612775"/>
-            <a:ext cx="5486400" cy="4114800"/>
+            <a:off x="5183188" y="987425"/>
+            <a:ext cx="6172200" cy="4873625"/>
           </a:xfrm>
         </p:spPr>
         <p:txBody>
-          <a:bodyPr/>
+          <a:bodyPr anchor="t"/>
           <a:lstStyle>
             <a:lvl1pPr marL="0" indent="0">
               <a:buNone/>
@@ -5388,7 +6053,7 @@
               <a:rPr lang="en-US" smtClean="0"/>
               <a:t>Click icon to add picture</a:t>
             </a:r>
-            <a:endParaRPr lang="en-US"/>
+            <a:endParaRPr lang="en-US" dirty="0"/>
           </a:p>
         </p:txBody>
       </p:sp>
@@ -5400,15 +6065,12 @@
           </p:cNvSpPr>
           <p:nvPr>
             <p:ph type="body" sz="half" idx="2"/>
-            <p:custDataLst>
-              <p:tags r:id="rId3"/>
-            </p:custDataLst>
           </p:nvPr>
         </p:nvSpPr>
         <p:spPr>
           <a:xfrm>
-            <a:off x="1792288" y="5367338"/>
-            <a:ext cx="5486400" cy="804862"/>
+            <a:off x="839788" y="2057400"/>
+            <a:ext cx="3932237" cy="3811588"/>
           </a:xfrm>
         </p:spPr>
         <p:txBody>
@@ -5416,39 +6078,39 @@
           <a:lstStyle>
             <a:lvl1pPr marL="0" indent="0">
               <a:buNone/>
-              <a:defRPr sz="1400"/>
+              <a:defRPr sz="1600"/>
             </a:lvl1pPr>
             <a:lvl2pPr marL="457200" indent="0">
               <a:buNone/>
-              <a:defRPr sz="1200"/>
+              <a:defRPr sz="1400"/>
             </a:lvl2pPr>
             <a:lvl3pPr marL="914400" indent="0">
               <a:buNone/>
-              <a:defRPr sz="1000"/>
+              <a:defRPr sz="1200"/>
             </a:lvl3pPr>
             <a:lvl4pPr marL="1371600" indent="0">
               <a:buNone/>
-              <a:defRPr sz="900"/>
+              <a:defRPr sz="1000"/>
             </a:lvl4pPr>
             <a:lvl5pPr marL="1828800" indent="0">
               <a:buNone/>
-              <a:defRPr sz="900"/>
+              <a:defRPr sz="1000"/>
             </a:lvl5pPr>
             <a:lvl6pPr marL="2286000" indent="0">
               <a:buNone/>
-              <a:defRPr sz="900"/>
+              <a:defRPr sz="1000"/>
             </a:lvl6pPr>
             <a:lvl7pPr marL="2743200" indent="0">
               <a:buNone/>
-              <a:defRPr sz="900"/>
+              <a:defRPr sz="1000"/>
             </a:lvl7pPr>
             <a:lvl8pPr marL="3200400" indent="0">
               <a:buNone/>
-              <a:defRPr sz="900"/>
+              <a:defRPr sz="1000"/>
             </a:lvl8pPr>
             <a:lvl9pPr marL="3657600" indent="0">
               <a:buNone/>
-              <a:defRPr sz="900"/>
+              <a:defRPr sz="1000"/>
             </a:lvl9pPr>
           </a:lstStyle>
           <a:p>
@@ -5457,13 +6119,78 @@
               <a:rPr lang="en-US" smtClean="0"/>
               <a:t>Click to edit Master text styles</a:t>
             </a:r>
+          </a:p>
+        </p:txBody>
+      </p:sp>
+      <p:sp>
+        <p:nvSpPr>
+          <p:cNvPr id="5" name="Date Placeholder 4"/>
+          <p:cNvSpPr>
+            <a:spLocks noGrp="1"/>
+          </p:cNvSpPr>
+          <p:nvPr>
+            <p:ph type="dt" sz="half" idx="10"/>
+          </p:nvPr>
+        </p:nvSpPr>
+        <p:spPr/>
+        <p:txBody>
+          <a:bodyPr/>
+          <a:lstStyle/>
+          <a:p>
+            <a:fld id="{EB044DB1-568E-4964-A02F-CCDCEAA70EF3}" type="datetimeFigureOut">
+              <a:rPr lang="en-US" smtClean="0"/>
+              <a:t>6/12/2013</a:t>
+            </a:fld>
+            <a:endParaRPr lang="en-US"/>
+          </a:p>
+        </p:txBody>
+      </p:sp>
+      <p:sp>
+        <p:nvSpPr>
+          <p:cNvPr id="6" name="Footer Placeholder 5"/>
+          <p:cNvSpPr>
+            <a:spLocks noGrp="1"/>
+          </p:cNvSpPr>
+          <p:nvPr>
+            <p:ph type="ftr" sz="quarter" idx="11"/>
+          </p:nvPr>
+        </p:nvSpPr>
+        <p:spPr/>
+        <p:txBody>
+          <a:bodyPr/>
+          <a:lstStyle/>
+          <a:p>
+            <a:endParaRPr lang="en-US"/>
+          </a:p>
+        </p:txBody>
+      </p:sp>
+      <p:sp>
+        <p:nvSpPr>
+          <p:cNvPr id="7" name="Slide Number Placeholder 6"/>
+          <p:cNvSpPr>
+            <a:spLocks noGrp="1"/>
+          </p:cNvSpPr>
+          <p:nvPr>
+            <p:ph type="sldNum" sz="quarter" idx="12"/>
+          </p:nvPr>
+        </p:nvSpPr>
+        <p:spPr/>
+        <p:txBody>
+          <a:bodyPr/>
+          <a:lstStyle/>
+          <a:p>
+            <a:fld id="{51CCE939-0FF0-4622-80D4-F7CCF5AA2A8E}" type="slidenum">
+              <a:rPr lang="en-US" smtClean="0"/>
+              <a:t>‹#›</a:t>
+            </a:fld>
+            <a:endParaRPr lang="en-US"/>
           </a:p>
         </p:txBody>
       </p:sp>
     </p:spTree>
     <p:extLst>
       <p:ext uri="{BB962C8B-B14F-4D97-AF65-F5344CB8AC3E}">
-        <p14:creationId xmlns:p14="http://schemas.microsoft.com/office/powerpoint/2010/main" val="3533634951"/>
+        <p14:creationId xmlns:p14="http://schemas.microsoft.com/office/powerpoint/2010/main" val="2121717722"/>
       </p:ext>
     </p:extLst>
   </p:cSld>
@@ -5477,12 +6204,9 @@
 <p:sldMaster xmlns:a="http://schemas.openxmlformats.org/drawingml/2006/main" xmlns:r="http://schemas.openxmlformats.org/officeDocument/2006/relationships" xmlns:p="http://schemas.openxmlformats.org/presentationml/2006/main">
   <p:cSld>
     <p:bg>
-      <p:bgPr>
-        <a:solidFill>
-          <a:srgbClr val="F4F2F2"/>
-        </a:solidFill>
-        <a:effectLst/>
-      </p:bgPr>
+      <p:bgRef idx="1001">
+        <a:schemeClr val="bg1"/>
+      </p:bgRef>
     </p:bg>
     <p:spTree>
       <p:nvGrpSpPr>
@@ -5506,22 +6230,16 @@
           </p:cNvSpPr>
           <p:nvPr>
             <p:ph type="title"/>
-            <p:custDataLst>
-              <p:tags r:id="rId13"/>
-            </p:custDataLst>
           </p:nvPr>
         </p:nvSpPr>
         <p:spPr>
           <a:xfrm>
-            <a:off x="0" y="274638"/>
-            <a:ext cx="9144000" cy="1143000"/>
+            <a:off x="838200" y="365125"/>
+            <a:ext cx="10515600" cy="1325563"/>
           </a:xfrm>
           <a:prstGeom prst="rect">
             <a:avLst/>
           </a:prstGeom>
-          <a:solidFill>
-            <a:srgbClr val="FFFFFF"/>
-          </a:solidFill>
         </p:spPr>
         <p:txBody>
           <a:bodyPr vert="horz" lIns="91440" tIns="45720" rIns="91440" bIns="45720" rtlCol="0" anchor="ctr">
@@ -5545,15 +6263,12 @@
           </p:cNvSpPr>
           <p:nvPr>
             <p:ph type="body" idx="1"/>
-            <p:custDataLst>
-              <p:tags r:id="rId14"/>
-            </p:custDataLst>
           </p:nvPr>
         </p:nvSpPr>
         <p:spPr>
           <a:xfrm>
-            <a:off x="457200" y="1600200"/>
-            <a:ext cx="8229600" cy="4876800"/>
+            <a:off x="838200" y="1825625"/>
+            <a:ext cx="10515600" cy="4351338"/>
           </a:xfrm>
           <a:prstGeom prst="rect">
             <a:avLst/>
@@ -5598,6 +6313,125 @@
               <a:rPr lang="en-US" smtClean="0"/>
               <a:t>Fifth level</a:t>
             </a:r>
+            <a:endParaRPr lang="en-US" dirty="0"/>
+          </a:p>
+        </p:txBody>
+      </p:sp>
+      <p:sp>
+        <p:nvSpPr>
+          <p:cNvPr id="4" name="Date Placeholder 3"/>
+          <p:cNvSpPr>
+            <a:spLocks noGrp="1"/>
+          </p:cNvSpPr>
+          <p:nvPr>
+            <p:ph type="dt" sz="half" idx="2"/>
+          </p:nvPr>
+        </p:nvSpPr>
+        <p:spPr>
+          <a:xfrm>
+            <a:off x="838200" y="6356350"/>
+            <a:ext cx="2743200" cy="365125"/>
+          </a:xfrm>
+          <a:prstGeom prst="rect">
+            <a:avLst/>
+          </a:prstGeom>
+        </p:spPr>
+        <p:txBody>
+          <a:bodyPr vert="horz" lIns="91440" tIns="45720" rIns="91440" bIns="45720" rtlCol="0" anchor="ctr"/>
+          <a:lstStyle>
+            <a:lvl1pPr algn="l">
+              <a:defRPr sz="1200">
+                <a:solidFill>
+                  <a:schemeClr val="tx1">
+                    <a:tint val="75000"/>
+                  </a:schemeClr>
+                </a:solidFill>
+              </a:defRPr>
+            </a:lvl1pPr>
+          </a:lstStyle>
+          <a:p>
+            <a:fld id="{EB044DB1-568E-4964-A02F-CCDCEAA70EF3}" type="datetimeFigureOut">
+              <a:rPr lang="en-US" smtClean="0"/>
+              <a:t>6/12/2013</a:t>
+            </a:fld>
+            <a:endParaRPr lang="en-US"/>
+          </a:p>
+        </p:txBody>
+      </p:sp>
+      <p:sp>
+        <p:nvSpPr>
+          <p:cNvPr id="5" name="Footer Placeholder 4"/>
+          <p:cNvSpPr>
+            <a:spLocks noGrp="1"/>
+          </p:cNvSpPr>
+          <p:nvPr>
+            <p:ph type="ftr" sz="quarter" idx="3"/>
+          </p:nvPr>
+        </p:nvSpPr>
+        <p:spPr>
+          <a:xfrm>
+            <a:off x="4038600" y="6356350"/>
+            <a:ext cx="4114800" cy="365125"/>
+          </a:xfrm>
+          <a:prstGeom prst="rect">
+            <a:avLst/>
+          </a:prstGeom>
+        </p:spPr>
+        <p:txBody>
+          <a:bodyPr vert="horz" lIns="91440" tIns="45720" rIns="91440" bIns="45720" rtlCol="0" anchor="ctr"/>
+          <a:lstStyle>
+            <a:lvl1pPr algn="ctr">
+              <a:defRPr sz="1200">
+                <a:solidFill>
+                  <a:schemeClr val="tx1">
+                    <a:tint val="75000"/>
+                  </a:schemeClr>
+                </a:solidFill>
+              </a:defRPr>
+            </a:lvl1pPr>
+          </a:lstStyle>
+          <a:p>
+            <a:endParaRPr lang="en-US"/>
+          </a:p>
+        </p:txBody>
+      </p:sp>
+      <p:sp>
+        <p:nvSpPr>
+          <p:cNvPr id="6" name="Slide Number Placeholder 5"/>
+          <p:cNvSpPr>
+            <a:spLocks noGrp="1"/>
+          </p:cNvSpPr>
+          <p:nvPr>
+            <p:ph type="sldNum" sz="quarter" idx="4"/>
+          </p:nvPr>
+        </p:nvSpPr>
+        <p:spPr>
+          <a:xfrm>
+            <a:off x="8610600" y="6356350"/>
+            <a:ext cx="2743200" cy="365125"/>
+          </a:xfrm>
+          <a:prstGeom prst="rect">
+            <a:avLst/>
+          </a:prstGeom>
+        </p:spPr>
+        <p:txBody>
+          <a:bodyPr vert="horz" lIns="91440" tIns="45720" rIns="91440" bIns="45720" rtlCol="0" anchor="ctr"/>
+          <a:lstStyle>
+            <a:lvl1pPr algn="r">
+              <a:defRPr sz="1200">
+                <a:solidFill>
+                  <a:schemeClr val="tx1">
+                    <a:tint val="75000"/>
+                  </a:schemeClr>
+                </a:solidFill>
+              </a:defRPr>
+            </a:lvl1pPr>
+          </a:lstStyle>
+          <a:p>
+            <a:fld id="{51CCE939-0FF0-4622-80D4-F7CCF5AA2A8E}" type="slidenum">
+              <a:rPr lang="en-US" smtClean="0"/>
+              <a:t>‹#›</a:t>
+            </a:fld>
             <a:endParaRPr lang="en-US"/>
           </a:p>
         </p:txBody>
@@ -5605,129 +6439,91 @@
     </p:spTree>
     <p:extLst>
       <p:ext uri="{BB962C8B-B14F-4D97-AF65-F5344CB8AC3E}">
-        <p14:creationId xmlns:p14="http://schemas.microsoft.com/office/powerpoint/2010/main" val="1273239305"/>
+        <p14:creationId xmlns:p14="http://schemas.microsoft.com/office/powerpoint/2010/main" val="1507862176"/>
       </p:ext>
     </p:extLst>
   </p:cSld>
   <p:clrMap bg1="lt1" tx1="dk1" bg2="lt2" tx2="dk2" accent1="accent1" accent2="accent2" accent3="accent3" accent4="accent4" accent5="accent5" accent6="accent6" hlink="hlink" folHlink="folHlink"/>
   <p:sldLayoutIdLst>
-    <p:sldLayoutId id="2147483649" r:id="rId1"/>
-    <p:sldLayoutId id="2147483650" r:id="rId2"/>
-    <p:sldLayoutId id="2147483651" r:id="rId3"/>
-    <p:sldLayoutId id="2147483652" r:id="rId4"/>
-    <p:sldLayoutId id="2147483653" r:id="rId5"/>
-    <p:sldLayoutId id="2147483654" r:id="rId6"/>
-    <p:sldLayoutId id="2147483655" r:id="rId7"/>
-    <p:sldLayoutId id="2147483656" r:id="rId8"/>
-    <p:sldLayoutId id="2147483657" r:id="rId9"/>
-    <p:sldLayoutId id="2147483658" r:id="rId10"/>
-    <p:sldLayoutId id="2147483659" r:id="rId11"/>
+    <p:sldLayoutId id="2147483675" r:id="rId1"/>
+    <p:sldLayoutId id="2147483676" r:id="rId2"/>
+    <p:sldLayoutId id="2147483677" r:id="rId3"/>
+    <p:sldLayoutId id="2147483678" r:id="rId4"/>
+    <p:sldLayoutId id="2147483679" r:id="rId5"/>
+    <p:sldLayoutId id="2147483680" r:id="rId6"/>
+    <p:sldLayoutId id="2147483681" r:id="rId7"/>
+    <p:sldLayoutId id="2147483682" r:id="rId8"/>
+    <p:sldLayoutId id="2147483683" r:id="rId9"/>
+    <p:sldLayoutId id="2147483684" r:id="rId10"/>
+    <p:sldLayoutId id="2147483685" r:id="rId11"/>
+    <p:sldLayoutId id="2147483686" r:id="rId12"/>
+    <p:sldLayoutId id="2147483687" r:id="rId13"/>
   </p:sldLayoutIdLst>
-  <p:timing>
-    <p:tnLst>
-      <p:par>
-        <p:cTn id="1" dur="indefinite" restart="never" nodeType="tmRoot"/>
-      </p:par>
-    </p:tnLst>
-  </p:timing>
   <p:txStyles>
     <p:titleStyle>
-      <a:lvl1pPr algn="ctr" defTabSz="457200" rtl="0" eaLnBrk="1" latinLnBrk="0" hangingPunct="1">
+      <a:lvl1pPr algn="l" defTabSz="914400" rtl="0" eaLnBrk="1" latinLnBrk="0" hangingPunct="1">
+        <a:lnSpc>
+          <a:spcPct val="90000"/>
+        </a:lnSpc>
         <a:spcBef>
           <a:spcPct val="0"/>
         </a:spcBef>
         <a:buNone/>
         <a:defRPr sz="4400" kern="1200">
           <a:solidFill>
-            <a:srgbClr val="0079C1"/>
+            <a:schemeClr val="tx1"/>
           </a:solidFill>
-          <a:latin typeface="Museo Sans 500"/>
+          <a:latin typeface="+mj-lt"/>
           <a:ea typeface="+mj-ea"/>
-          <a:cs typeface="Museo Sans 500"/>
+          <a:cs typeface="+mj-cs"/>
         </a:defRPr>
       </a:lvl1pPr>
     </p:titleStyle>
     <p:bodyStyle>
-      <a:lvl1pPr marL="342900" indent="-342900" algn="l" defTabSz="457200" rtl="0" eaLnBrk="1" latinLnBrk="0" hangingPunct="1">
+      <a:lvl1pPr marL="228600" indent="-228600" algn="l" defTabSz="914400" rtl="0" eaLnBrk="1" latinLnBrk="0" hangingPunct="1">
+        <a:lnSpc>
+          <a:spcPct val="90000"/>
+        </a:lnSpc>
         <a:spcBef>
-          <a:spcPct val="20000"/>
+          <a:spcPts val="1000"/>
         </a:spcBef>
-        <a:buFont typeface="Arial"/>
+        <a:buFont typeface="Arial" panose="020B0604020202020204" pitchFamily="34" charset="0"/>
         <a:buChar char="•"/>
-        <a:defRPr sz="3200" kern="1200">
+        <a:defRPr sz="2800" kern="1200">
           <a:solidFill>
-            <a:srgbClr val="404040"/>
+            <a:schemeClr val="tx1"/>
           </a:solidFill>
-          <a:latin typeface="Museo Sans 500"/>
+          <a:latin typeface="+mn-lt"/>
           <a:ea typeface="+mn-ea"/>
-          <a:cs typeface="Museo Sans 500"/>
+          <a:cs typeface="+mn-cs"/>
         </a:defRPr>
       </a:lvl1pPr>
-      <a:lvl2pPr marL="742950" indent="-285750" algn="l" defTabSz="457200" rtl="0" eaLnBrk="1" latinLnBrk="0" hangingPunct="1">
+      <a:lvl2pPr marL="685800" indent="-228600" algn="l" defTabSz="914400" rtl="0" eaLnBrk="1" latinLnBrk="0" hangingPunct="1">
+        <a:lnSpc>
+          <a:spcPct val="90000"/>
+        </a:lnSpc>
         <a:spcBef>
-          <a:spcPct val="20000"/>
+          <a:spcPts val="500"/>
         </a:spcBef>
-        <a:buFont typeface="Arial"/>
-        <a:buChar char="–"/>
-        <a:defRPr sz="2800" kern="1200">
-          <a:solidFill>
-            <a:srgbClr val="404040"/>
-          </a:solidFill>
-          <a:latin typeface="Museo Sans 500"/>
-          <a:ea typeface="+mn-ea"/>
-          <a:cs typeface="Museo Sans 500"/>
-        </a:defRPr>
-      </a:lvl2pPr>
-      <a:lvl3pPr marL="1143000" indent="-228600" algn="l" defTabSz="457200" rtl="0" eaLnBrk="1" latinLnBrk="0" hangingPunct="1">
-        <a:spcBef>
-          <a:spcPct val="20000"/>
-        </a:spcBef>
-        <a:buFont typeface="Arial"/>
+        <a:buFont typeface="Arial" panose="020B0604020202020204" pitchFamily="34" charset="0"/>
         <a:buChar char="•"/>
         <a:defRPr sz="2400" kern="1200">
           <a:solidFill>
-            <a:srgbClr val="404040"/>
+            <a:schemeClr val="tx1"/>
           </a:solidFill>
-          <a:latin typeface="Museo Sans 500"/>
+          <a:latin typeface="+mn-lt"/>
           <a:ea typeface="+mn-ea"/>
-          <a:cs typeface="Museo Sans 500"/>
+          <a:cs typeface="+mn-cs"/>
         </a:defRPr>
-      </a:lvl3pPr>
-      <a:lvl4pPr marL="1600200" indent="-228600" algn="l" defTabSz="457200" rtl="0" eaLnBrk="1" latinLnBrk="0" hangingPunct="1">
+      </a:lvl2pPr>
+      <a:lvl3pPr marL="1143000" indent="-228600" algn="l" defTabSz="914400" rtl="0" eaLnBrk="1" latinLnBrk="0" hangingPunct="1">
+        <a:lnSpc>
+          <a:spcPct val="90000"/>
+        </a:lnSpc>
         <a:spcBef>
-          <a:spcPct val="20000"/>
+          <a:spcPts val="500"/>
         </a:spcBef>
-        <a:buFont typeface="Arial"/>
-        <a:buChar char="–"/>
-        <a:defRPr sz="2000" kern="1200">
-          <a:solidFill>
-            <a:srgbClr val="404040"/>
-          </a:solidFill>
-          <a:latin typeface="Museo Sans 500"/>
-          <a:ea typeface="+mn-ea"/>
-          <a:cs typeface="Museo Sans 500"/>
-        </a:defRPr>
-      </a:lvl4pPr>
-      <a:lvl5pPr marL="2057400" indent="-228600" algn="l" defTabSz="457200" rtl="0" eaLnBrk="1" latinLnBrk="0" hangingPunct="1">
-        <a:spcBef>
-          <a:spcPct val="20000"/>
-        </a:spcBef>
-        <a:buFont typeface="Arial"/>
-        <a:buChar char="»"/>
-        <a:defRPr sz="2000" kern="1200">
-          <a:solidFill>
-            <a:srgbClr val="404040"/>
-          </a:solidFill>
-          <a:latin typeface="Museo Sans 500"/>
-          <a:ea typeface="+mn-ea"/>
-          <a:cs typeface="Museo Sans 500"/>
-        </a:defRPr>
-      </a:lvl5pPr>
-      <a:lvl6pPr marL="2514600" indent="-228600" algn="l" defTabSz="457200" rtl="0" eaLnBrk="1" latinLnBrk="0" hangingPunct="1">
-        <a:spcBef>
-          <a:spcPct val="20000"/>
-        </a:spcBef>
-        <a:buFont typeface="Arial"/>
+        <a:buFont typeface="Arial" panose="020B0604020202020204" pitchFamily="34" charset="0"/>
         <a:buChar char="•"/>
         <a:defRPr sz="2000" kern="1200">
           <a:solidFill>
@@ -5737,14 +6533,71 @@
           <a:ea typeface="+mn-ea"/>
           <a:cs typeface="+mn-cs"/>
         </a:defRPr>
+      </a:lvl3pPr>
+      <a:lvl4pPr marL="1600200" indent="-228600" algn="l" defTabSz="914400" rtl="0" eaLnBrk="1" latinLnBrk="0" hangingPunct="1">
+        <a:lnSpc>
+          <a:spcPct val="90000"/>
+        </a:lnSpc>
+        <a:spcBef>
+          <a:spcPts val="500"/>
+        </a:spcBef>
+        <a:buFont typeface="Arial" panose="020B0604020202020204" pitchFamily="34" charset="0"/>
+        <a:buChar char="•"/>
+        <a:defRPr sz="1800" kern="1200">
+          <a:solidFill>
+            <a:schemeClr val="tx1"/>
+          </a:solidFill>
+          <a:latin typeface="+mn-lt"/>
+          <a:ea typeface="+mn-ea"/>
+          <a:cs typeface="+mn-cs"/>
+        </a:defRPr>
+      </a:lvl4pPr>
+      <a:lvl5pPr marL="2057400" indent="-228600" algn="l" defTabSz="914400" rtl="0" eaLnBrk="1" latinLnBrk="0" hangingPunct="1">
+        <a:lnSpc>
+          <a:spcPct val="90000"/>
+        </a:lnSpc>
+        <a:spcBef>
+          <a:spcPts val="500"/>
+        </a:spcBef>
+        <a:buFont typeface="Arial" panose="020B0604020202020204" pitchFamily="34" charset="0"/>
+        <a:buChar char="•"/>
+        <a:defRPr sz="1800" kern="1200">
+          <a:solidFill>
+            <a:schemeClr val="tx1"/>
+          </a:solidFill>
+          <a:latin typeface="+mn-lt"/>
+          <a:ea typeface="+mn-ea"/>
+          <a:cs typeface="+mn-cs"/>
+        </a:defRPr>
+      </a:lvl5pPr>
+      <a:lvl6pPr marL="2514600" indent="-228600" algn="l" defTabSz="914400" rtl="0" eaLnBrk="1" latinLnBrk="0" hangingPunct="1">
+        <a:lnSpc>
+          <a:spcPct val="90000"/>
+        </a:lnSpc>
+        <a:spcBef>
+          <a:spcPts val="500"/>
+        </a:spcBef>
+        <a:buFont typeface="Arial" panose="020B0604020202020204" pitchFamily="34" charset="0"/>
+        <a:buChar char="•"/>
+        <a:defRPr sz="1800" kern="1200">
+          <a:solidFill>
+            <a:schemeClr val="tx1"/>
+          </a:solidFill>
+          <a:latin typeface="+mn-lt"/>
+          <a:ea typeface="+mn-ea"/>
+          <a:cs typeface="+mn-cs"/>
+        </a:defRPr>
       </a:lvl6pPr>
-      <a:lvl7pPr marL="2971800" indent="-228600" algn="l" defTabSz="457200" rtl="0" eaLnBrk="1" latinLnBrk="0" hangingPunct="1">
+      <a:lvl7pPr marL="2971800" indent="-228600" algn="l" defTabSz="914400" rtl="0" eaLnBrk="1" latinLnBrk="0" hangingPunct="1">
+        <a:lnSpc>
+          <a:spcPct val="90000"/>
+        </a:lnSpc>
         <a:spcBef>
-          <a:spcPct val="20000"/>
+          <a:spcPts val="500"/>
         </a:spcBef>
-        <a:buFont typeface="Arial"/>
+        <a:buFont typeface="Arial" panose="020B0604020202020204" pitchFamily="34" charset="0"/>
         <a:buChar char="•"/>
-        <a:defRPr sz="2000" kern="1200">
+        <a:defRPr sz="1800" kern="1200">
           <a:solidFill>
             <a:schemeClr val="tx1"/>
           </a:solidFill>
@@ -5753,13 +6606,16 @@
           <a:cs typeface="+mn-cs"/>
         </a:defRPr>
       </a:lvl7pPr>
-      <a:lvl8pPr marL="3429000" indent="-228600" algn="l" defTabSz="457200" rtl="0" eaLnBrk="1" latinLnBrk="0" hangingPunct="1">
+      <a:lvl8pPr marL="3429000" indent="-228600" algn="l" defTabSz="914400" rtl="0" eaLnBrk="1" latinLnBrk="0" hangingPunct="1">
+        <a:lnSpc>
+          <a:spcPct val="90000"/>
+        </a:lnSpc>
         <a:spcBef>
-          <a:spcPct val="20000"/>
+          <a:spcPts val="500"/>
         </a:spcBef>
-        <a:buFont typeface="Arial"/>
+        <a:buFont typeface="Arial" panose="020B0604020202020204" pitchFamily="34" charset="0"/>
         <a:buChar char="•"/>
-        <a:defRPr sz="2000" kern="1200">
+        <a:defRPr sz="1800" kern="1200">
           <a:solidFill>
             <a:schemeClr val="tx1"/>
           </a:solidFill>
@@ -5768,13 +6624,16 @@
           <a:cs typeface="+mn-cs"/>
         </a:defRPr>
       </a:lvl8pPr>
-      <a:lvl9pPr marL="3886200" indent="-228600" algn="l" defTabSz="457200" rtl="0" eaLnBrk="1" latinLnBrk="0" hangingPunct="1">
+      <a:lvl9pPr marL="3886200" indent="-228600" algn="l" defTabSz="914400" rtl="0" eaLnBrk="1" latinLnBrk="0" hangingPunct="1">
+        <a:lnSpc>
+          <a:spcPct val="90000"/>
+        </a:lnSpc>
         <a:spcBef>
-          <a:spcPct val="20000"/>
+          <a:spcPts val="500"/>
         </a:spcBef>
-        <a:buFont typeface="Arial"/>
+        <a:buFont typeface="Arial" panose="020B0604020202020204" pitchFamily="34" charset="0"/>
         <a:buChar char="•"/>
-        <a:defRPr sz="2000" kern="1200">
+        <a:defRPr sz="1800" kern="1200">
           <a:solidFill>
             <a:schemeClr val="tx1"/>
           </a:solidFill>
@@ -5788,7 +6647,7 @@
       <a:defPPr>
         <a:defRPr lang="en-US"/>
       </a:defPPr>
-      <a:lvl1pPr marL="0" algn="l" defTabSz="457200" rtl="0" eaLnBrk="1" latinLnBrk="0" hangingPunct="1">
+      <a:lvl1pPr marL="0" algn="l" defTabSz="914400" rtl="0" eaLnBrk="1" latinLnBrk="0" hangingPunct="1">
         <a:defRPr sz="1800" kern="1200">
           <a:solidFill>
             <a:schemeClr val="tx1"/>
@@ -5798,7 +6657,7 @@
           <a:cs typeface="+mn-cs"/>
         </a:defRPr>
       </a:lvl1pPr>
-      <a:lvl2pPr marL="457200" algn="l" defTabSz="457200" rtl="0" eaLnBrk="1" latinLnBrk="0" hangingPunct="1">
+      <a:lvl2pPr marL="457200" algn="l" defTabSz="914400" rtl="0" eaLnBrk="1" latinLnBrk="0" hangingPunct="1">
         <a:defRPr sz="1800" kern="1200">
           <a:solidFill>
             <a:schemeClr val="tx1"/>
@@ -5808,7 +6667,7 @@
           <a:cs typeface="+mn-cs"/>
         </a:defRPr>
       </a:lvl2pPr>
-      <a:lvl3pPr marL="914400" algn="l" defTabSz="457200" rtl="0" eaLnBrk="1" latinLnBrk="0" hangingPunct="1">
+      <a:lvl3pPr marL="914400" algn="l" defTabSz="914400" rtl="0" eaLnBrk="1" latinLnBrk="0" hangingPunct="1">
         <a:defRPr sz="1800" kern="1200">
           <a:solidFill>
             <a:schemeClr val="tx1"/>
@@ -5818,7 +6677,7 @@
           <a:cs typeface="+mn-cs"/>
         </a:defRPr>
       </a:lvl3pPr>
-      <a:lvl4pPr marL="1371600" algn="l" defTabSz="457200" rtl="0" eaLnBrk="1" latinLnBrk="0" hangingPunct="1">
+      <a:lvl4pPr marL="1371600" algn="l" defTabSz="914400" rtl="0" eaLnBrk="1" latinLnBrk="0" hangingPunct="1">
         <a:defRPr sz="1800" kern="1200">
           <a:solidFill>
             <a:schemeClr val="tx1"/>
@@ -5828,7 +6687,7 @@
           <a:cs typeface="+mn-cs"/>
         </a:defRPr>
       </a:lvl4pPr>
-      <a:lvl5pPr marL="1828800" algn="l" defTabSz="457200" rtl="0" eaLnBrk="1" latinLnBrk="0" hangingPunct="1">
+      <a:lvl5pPr marL="1828800" algn="l" defTabSz="914400" rtl="0" eaLnBrk="1" latinLnBrk="0" hangingPunct="1">
         <a:defRPr sz="1800" kern="1200">
           <a:solidFill>
             <a:schemeClr val="tx1"/>
@@ -5838,7 +6697,7 @@
           <a:cs typeface="+mn-cs"/>
         </a:defRPr>
       </a:lvl5pPr>
-      <a:lvl6pPr marL="2286000" algn="l" defTabSz="457200" rtl="0" eaLnBrk="1" latinLnBrk="0" hangingPunct="1">
+      <a:lvl6pPr marL="2286000" algn="l" defTabSz="914400" rtl="0" eaLnBrk="1" latinLnBrk="0" hangingPunct="1">
         <a:defRPr sz="1800" kern="1200">
           <a:solidFill>
             <a:schemeClr val="tx1"/>
@@ -5848,7 +6707,7 @@
           <a:cs typeface="+mn-cs"/>
         </a:defRPr>
       </a:lvl6pPr>
-      <a:lvl7pPr marL="2743200" algn="l" defTabSz="457200" rtl="0" eaLnBrk="1" latinLnBrk="0" hangingPunct="1">
+      <a:lvl7pPr marL="2743200" algn="l" defTabSz="914400" rtl="0" eaLnBrk="1" latinLnBrk="0" hangingPunct="1">
         <a:defRPr sz="1800" kern="1200">
           <a:solidFill>
             <a:schemeClr val="tx1"/>
@@ -5858,7 +6717,7 @@
           <a:cs typeface="+mn-cs"/>
         </a:defRPr>
       </a:lvl7pPr>
-      <a:lvl8pPr marL="3200400" algn="l" defTabSz="457200" rtl="0" eaLnBrk="1" latinLnBrk="0" hangingPunct="1">
+      <a:lvl8pPr marL="3200400" algn="l" defTabSz="914400" rtl="0" eaLnBrk="1" latinLnBrk="0" hangingPunct="1">
         <a:defRPr sz="1800" kern="1200">
           <a:solidFill>
             <a:schemeClr val="tx1"/>
@@ -5868,7 +6727,7 @@
           <a:cs typeface="+mn-cs"/>
         </a:defRPr>
       </a:lvl8pPr>
-      <a:lvl9pPr marL="3657600" algn="l" defTabSz="457200" rtl="0" eaLnBrk="1" latinLnBrk="0" hangingPunct="1">
+      <a:lvl9pPr marL="3657600" algn="l" defTabSz="914400" rtl="0" eaLnBrk="1" latinLnBrk="0" hangingPunct="1">
         <a:defRPr sz="1800" kern="1200">
           <a:solidFill>
             <a:schemeClr val="tx1"/>
@@ -5915,12 +6774,14 @@
         </p:nvSpPr>
         <p:spPr>
           <a:xfrm>
-            <a:off x="-152400" y="2130425"/>
+            <a:off x="1371600" y="2130426"/>
             <a:ext cx="9144000" cy="1470025"/>
           </a:xfrm>
         </p:spPr>
         <p:txBody>
-          <a:bodyPr/>
+          <a:bodyPr>
+            <a:normAutofit fontScale="90000"/>
+          </a:bodyPr>
           <a:lstStyle/>
           <a:p>
             <a:r>
@@ -5946,7 +6807,7 @@
         </p:nvSpPr>
         <p:spPr>
           <a:xfrm>
-            <a:off x="1371600" y="3775838"/>
+            <a:off x="2895600" y="3775838"/>
             <a:ext cx="6400800" cy="1752600"/>
           </a:xfrm>
         </p:spPr>
@@ -5987,193 +6848,6 @@
           </a:p>
         </p:txBody>
       </p:sp>
-      <p:pic>
-        <p:nvPicPr>
-          <p:cNvPr id="4" name="Picture 4" descr="https://mvp.support.microsoft.com/library/images/support/en-US/MVPLogo.gif"/>
-          <p:cNvPicPr>
-            <a:picLocks noChangeAspect="1" noChangeArrowheads="1"/>
-          </p:cNvPicPr>
-          <p:nvPr/>
-        </p:nvPicPr>
-        <p:blipFill>
-          <a:blip r:embed="rId6">
-            <a:extLst>
-              <a:ext uri="{28A0092B-C50C-407E-A947-70E740481C1C}">
-                <a14:useLocalDpi xmlns:a14="http://schemas.microsoft.com/office/drawing/2010/main" val="0"/>
-              </a:ext>
-            </a:extLst>
-          </a:blip>
-          <a:srcRect/>
-          <a:stretch>
-            <a:fillRect/>
-          </a:stretch>
-        </p:blipFill>
-        <p:spPr bwMode="auto">
-          <a:xfrm>
-            <a:off x="7620000" y="3707219"/>
-            <a:ext cx="1095375" cy="1714500"/>
-          </a:xfrm>
-          <a:prstGeom prst="rect">
-            <a:avLst/>
-          </a:prstGeom>
-          <a:noFill/>
-          <a:extLst>
-            <a:ext uri="{909E8E84-426E-40DD-AFC4-6F175D3DCCD1}">
-              <a14:hiddenFill xmlns:a14="http://schemas.microsoft.com/office/drawing/2010/main">
-                <a:solidFill>
-                  <a:srgbClr val="FFFFFF"/>
-                </a:solidFill>
-              </a14:hiddenFill>
-            </a:ext>
-          </a:extLst>
-        </p:spPr>
-      </p:pic>
-      <p:pic>
-        <p:nvPicPr>
-          <p:cNvPr id="5" name="Picture 8" descr="http://lostechies.com/wp-content/themes/lostechies/images/lostechies_logo.png"/>
-          <p:cNvPicPr>
-            <a:picLocks noChangeAspect="1" noChangeArrowheads="1"/>
-          </p:cNvPicPr>
-          <p:nvPr/>
-        </p:nvPicPr>
-        <p:blipFill>
-          <a:blip r:embed="rId7">
-            <a:extLst>
-              <a:ext uri="{28A0092B-C50C-407E-A947-70E740481C1C}">
-                <a14:useLocalDpi xmlns:a14="http://schemas.microsoft.com/office/drawing/2010/main" val="0"/>
-              </a:ext>
-            </a:extLst>
-          </a:blip>
-          <a:srcRect/>
-          <a:stretch>
-            <a:fillRect/>
-          </a:stretch>
-        </p:blipFill>
-        <p:spPr bwMode="auto">
-          <a:xfrm>
-            <a:off x="-376975" y="5889789"/>
-            <a:ext cx="5578180" cy="676503"/>
-          </a:xfrm>
-          <a:prstGeom prst="rect">
-            <a:avLst/>
-          </a:prstGeom>
-          <a:noFill/>
-          <a:extLst>
-            <a:ext uri="{909E8E84-426E-40DD-AFC4-6F175D3DCCD1}">
-              <a14:hiddenFill xmlns:a14="http://schemas.microsoft.com/office/drawing/2010/main">
-                <a:solidFill>
-                  <a:srgbClr val="FFFFFF"/>
-                </a:solidFill>
-              </a14:hiddenFill>
-            </a:ext>
-          </a:extLst>
-        </p:spPr>
-      </p:pic>
-      <p:pic>
-        <p:nvPicPr>
-          <p:cNvPr id="6" name="Picture 2" descr="http://www.manning.com/palermo3/palermo3_cover150.jpg"/>
-          <p:cNvPicPr>
-            <a:picLocks noChangeAspect="1" noChangeArrowheads="1"/>
-          </p:cNvPicPr>
-          <p:nvPr/>
-        </p:nvPicPr>
-        <p:blipFill>
-          <a:blip r:embed="rId8">
-            <a:extLst>
-              <a:ext uri="{28A0092B-C50C-407E-A947-70E740481C1C}">
-                <a14:useLocalDpi xmlns:a14="http://schemas.microsoft.com/office/drawing/2010/main" val="0"/>
-              </a:ext>
-            </a:extLst>
-          </a:blip>
-          <a:srcRect/>
-          <a:stretch>
-            <a:fillRect/>
-          </a:stretch>
-        </p:blipFill>
-        <p:spPr bwMode="auto">
-          <a:xfrm>
-            <a:off x="303028" y="3810000"/>
-            <a:ext cx="1428750" cy="1790701"/>
-          </a:xfrm>
-          <a:prstGeom prst="rect">
-            <a:avLst/>
-          </a:prstGeom>
-          <a:noFill/>
-          <a:extLst>
-            <a:ext uri="{909E8E84-426E-40DD-AFC4-6F175D3DCCD1}">
-              <a14:hiddenFill xmlns:a14="http://schemas.microsoft.com/office/drawing/2010/main">
-                <a:solidFill>
-                  <a:srgbClr val="FFFFFF"/>
-                </a:solidFill>
-              </a14:hiddenFill>
-            </a:ext>
-          </a:extLst>
-        </p:spPr>
-      </p:pic>
-      <p:pic>
-        <p:nvPicPr>
-          <p:cNvPr id="1026" name="Picture 2"/>
-          <p:cNvPicPr>
-            <a:picLocks noChangeAspect="1" noChangeArrowheads="1"/>
-          </p:cNvPicPr>
-          <p:nvPr/>
-        </p:nvPicPr>
-        <p:blipFill>
-          <a:blip r:embed="rId9">
-            <a:extLst>
-              <a:ext uri="{28A0092B-C50C-407E-A947-70E740481C1C}">
-                <a14:useLocalDpi xmlns:a14="http://schemas.microsoft.com/office/drawing/2010/main" val="0"/>
-              </a:ext>
-            </a:extLst>
-          </a:blip>
-          <a:srcRect/>
-          <a:stretch>
-            <a:fillRect/>
-          </a:stretch>
-        </p:blipFill>
-        <p:spPr bwMode="auto">
-          <a:xfrm>
-            <a:off x="4676775" y="6098955"/>
-            <a:ext cx="4314825" cy="441880"/>
-          </a:xfrm>
-          <a:prstGeom prst="rect">
-            <a:avLst/>
-          </a:prstGeom>
-          <a:noFill/>
-          <a:ln>
-            <a:noFill/>
-          </a:ln>
-          <a:effectLst/>
-          <a:extLst>
-            <a:ext uri="{909E8E84-426E-40DD-AFC4-6F175D3DCCD1}">
-              <a14:hiddenFill xmlns:a14="http://schemas.microsoft.com/office/drawing/2010/main">
-                <a:solidFill>
-                  <a:schemeClr val="accent1"/>
-                </a:solidFill>
-              </a14:hiddenFill>
-            </a:ext>
-            <a:ext uri="{91240B29-F687-4F45-9708-019B960494DF}">
-              <a14:hiddenLine xmlns:a14="http://schemas.microsoft.com/office/drawing/2010/main" w="9525">
-                <a:solidFill>
-                  <a:schemeClr val="tx1"/>
-                </a:solidFill>
-                <a:miter lim="800000"/>
-                <a:headEnd/>
-                <a:tailEnd/>
-              </a14:hiddenLine>
-            </a:ext>
-            <a:ext uri="{AF507438-7753-43E0-B8FC-AC1667EBCBE1}">
-              <a14:hiddenEffects xmlns:a14="http://schemas.microsoft.com/office/drawing/2010/main">
-                <a:effectLst>
-                  <a:outerShdw dist="35921" dir="2700000" algn="ctr" rotWithShape="0">
-                    <a:schemeClr val="bg2"/>
-                  </a:outerShdw>
-                </a:effectLst>
-              </a14:hiddenEffects>
-            </a:ext>
-          </a:extLst>
-        </p:spPr>
-      </p:pic>
     </p:spTree>
     <p:custDataLst>
       <p:tags r:id="rId1"/>
@@ -6279,7 +6953,7 @@
         </p:blipFill>
         <p:spPr bwMode="auto">
           <a:xfrm>
-            <a:off x="2168524" y="1541992"/>
+            <a:off x="3692525" y="1541993"/>
             <a:ext cx="4943475" cy="4943475"/>
           </a:xfrm>
           <a:prstGeom prst="rect">
@@ -6422,7 +7096,7 @@
         </p:blipFill>
         <p:spPr bwMode="auto">
           <a:xfrm>
-            <a:off x="779988" y="1634068"/>
+            <a:off x="2303988" y="1634068"/>
             <a:ext cx="7906808" cy="4810406"/>
           </a:xfrm>
           <a:prstGeom prst="rect">
@@ -6565,7 +7239,7 @@
         </p:blipFill>
         <p:spPr bwMode="auto">
           <a:xfrm>
-            <a:off x="2779269" y="3039534"/>
+            <a:off x="4303269" y="3039534"/>
             <a:ext cx="3290358" cy="3290358"/>
           </a:xfrm>
           <a:prstGeom prst="rect">
@@ -6606,7 +7280,7 @@
         </p:blipFill>
         <p:spPr bwMode="auto">
           <a:xfrm>
-            <a:off x="5947985" y="1600200"/>
+            <a:off x="7471985" y="1600200"/>
             <a:ext cx="2493282" cy="3297238"/>
           </a:xfrm>
           <a:prstGeom prst="rect">
@@ -6647,7 +7321,7 @@
         </p:blipFill>
         <p:spPr bwMode="auto">
           <a:xfrm>
-            <a:off x="341842" y="1600200"/>
+            <a:off x="1865843" y="1600200"/>
             <a:ext cx="2561251" cy="3273600"/>
           </a:xfrm>
           <a:prstGeom prst="rect">
@@ -6767,7 +7441,7 @@
         </p:blipFill>
         <p:spPr bwMode="auto">
           <a:xfrm>
-            <a:off x="1066801" y="1507914"/>
+            <a:off x="2590802" y="1507915"/>
             <a:ext cx="6832599" cy="5135773"/>
           </a:xfrm>
           <a:prstGeom prst="rect">
@@ -6881,7 +7555,7 @@
           </p:nvPr>
         </p:nvGraphicFramePr>
         <p:xfrm>
-          <a:off x="2464829" y="1876741"/>
+          <a:off x="3988830" y="1876742"/>
           <a:ext cx="3438419" cy="2846227"/>
         </p:xfrm>
         <a:graphic>
@@ -6898,7 +7572,7 @@
         </p:nvSpPr>
         <p:spPr bwMode="auto">
           <a:xfrm>
-            <a:off x="2471679" y="4866812"/>
+            <a:off x="3995680" y="4866813"/>
             <a:ext cx="3452117" cy="1469205"/>
           </a:xfrm>
           <a:prstGeom prst="flowChartMagneticDisk">
@@ -6933,48 +7607,28 @@
           </a:bodyPr>
           <a:lstStyle/>
           <a:p>
-            <a:pPr marL="0" marR="0" lvl="0" indent="0" defTabSz="914400" rtl="0" eaLnBrk="1" fontAlgn="base" latinLnBrk="0" hangingPunct="1">
-              <a:lnSpc>
-                <a:spcPct val="100000"/>
-              </a:lnSpc>
+            <a:pPr defTabSz="914400" fontAlgn="base">
               <a:spcBef>
                 <a:spcPct val="0"/>
               </a:spcBef>
               <a:spcAft>
                 <a:spcPct val="0"/>
               </a:spcAft>
-              <a:buClrTx/>
-              <a:buSzTx/>
-              <a:buFontTx/>
-              <a:buNone/>
-              <a:tabLst/>
               <a:defRPr/>
             </a:pPr>
             <a:r>
-              <a:rPr kumimoji="0" lang="en-US" sz="4800" b="0" i="0" u="none" strike="noStrike" kern="0" cap="none" spc="0" normalizeH="0" baseline="0" noProof="0" dirty="0" smtClean="0">
-                <a:ln>
-                  <a:noFill/>
-                </a:ln>
+              <a:rPr lang="en-US" sz="4800" kern="0" dirty="0">
                 <a:solidFill>
                   <a:schemeClr val="bg1"/>
                 </a:solidFill>
-                <a:effectLst/>
-                <a:uLnTx/>
-                <a:uFillTx/>
                 <a:latin typeface="Franklin Gothic Book" pitchFamily="34" charset="0"/>
               </a:rPr>
               <a:t>DB</a:t>
             </a:r>
-            <a:endParaRPr kumimoji="0" lang="en-US" sz="3200" b="0" i="0" u="none" strike="noStrike" kern="0" cap="none" spc="0" normalizeH="0" baseline="0" noProof="0" dirty="0" smtClean="0">
-              <a:ln>
-                <a:noFill/>
-              </a:ln>
+            <a:endParaRPr lang="en-US" sz="3200" kern="0" dirty="0">
               <a:solidFill>
                 <a:schemeClr val="bg1"/>
               </a:solidFill>
-              <a:effectLst/>
-              <a:uLnTx/>
-              <a:uFillTx/>
               <a:latin typeface="Franklin Gothic Book" pitchFamily="34" charset="0"/>
             </a:endParaRPr>
           </a:p>
@@ -6988,7 +7642,7 @@
         </p:nvSpPr>
         <p:spPr bwMode="auto">
           <a:xfrm>
-            <a:off x="3940864" y="1527705"/>
+            <a:off x="5464865" y="1527705"/>
             <a:ext cx="503453" cy="5120640"/>
           </a:xfrm>
           <a:prstGeom prst="roundRect">
@@ -7021,27 +7675,16 @@
           </a:bodyPr>
           <a:lstStyle/>
           <a:p>
-            <a:pPr marL="0" marR="0" lvl="0" indent="0" algn="l" defTabSz="914400" rtl="0" eaLnBrk="1" fontAlgn="base" latinLnBrk="0" hangingPunct="1">
-              <a:lnSpc>
-                <a:spcPct val="100000"/>
-              </a:lnSpc>
+            <a:pPr defTabSz="914400" fontAlgn="base">
               <a:spcBef>
                 <a:spcPct val="0"/>
               </a:spcBef>
               <a:spcAft>
                 <a:spcPct val="0"/>
               </a:spcAft>
-              <a:buClrTx/>
-              <a:buSzTx/>
-              <a:buFontTx/>
-              <a:buNone/>
-              <a:tabLst/>
               <a:defRPr/>
             </a:pPr>
-            <a:endParaRPr kumimoji="0" lang="en-US" sz="3200" b="1" i="0" u="none" strike="noStrike" kern="0" cap="none" spc="0" normalizeH="0" baseline="0" noProof="0" smtClean="0">
-              <a:ln>
-                <a:noFill/>
-              </a:ln>
+            <a:endParaRPr lang="en-US" sz="3200" b="1" kern="0">
               <a:solidFill>
                 <a:srgbClr val="FFFFFF"/>
               </a:solidFill>
@@ -7052,8 +7695,6 @@
                   </a:srgbClr>
                 </a:outerShdw>
               </a:effectLst>
-              <a:uLnTx/>
-              <a:uFillTx/>
               <a:latin typeface="Franklin Gothic Medium" pitchFamily="34" charset="0"/>
             </a:endParaRPr>
           </a:p>
@@ -7067,7 +7708,7 @@
         </p:nvSpPr>
         <p:spPr bwMode="auto">
           <a:xfrm>
-            <a:off x="4576142" y="1536269"/>
+            <a:off x="6100143" y="1536269"/>
             <a:ext cx="503453" cy="5120640"/>
           </a:xfrm>
           <a:prstGeom prst="roundRect">
@@ -7100,27 +7741,16 @@
           </a:bodyPr>
           <a:lstStyle/>
           <a:p>
-            <a:pPr marL="0" marR="0" lvl="0" indent="0" algn="l" defTabSz="914400" rtl="0" eaLnBrk="1" fontAlgn="base" latinLnBrk="0" hangingPunct="1">
-              <a:lnSpc>
-                <a:spcPct val="100000"/>
-              </a:lnSpc>
+            <a:pPr defTabSz="914400" fontAlgn="base">
               <a:spcBef>
                 <a:spcPct val="0"/>
               </a:spcBef>
               <a:spcAft>
                 <a:spcPct val="0"/>
               </a:spcAft>
-              <a:buClrTx/>
-              <a:buSzTx/>
-              <a:buFontTx/>
-              <a:buNone/>
-              <a:tabLst/>
               <a:defRPr/>
             </a:pPr>
-            <a:endParaRPr kumimoji="0" lang="en-US" sz="3200" b="1" i="0" u="none" strike="noStrike" kern="0" cap="none" spc="0" normalizeH="0" baseline="0" noProof="0" smtClean="0">
-              <a:ln>
-                <a:noFill/>
-              </a:ln>
+            <a:endParaRPr lang="en-US" sz="3200" b="1" kern="0">
               <a:solidFill>
                 <a:srgbClr val="FFFFFF"/>
               </a:solidFill>
@@ -7131,8 +7761,6 @@
                   </a:srgbClr>
                 </a:outerShdw>
               </a:effectLst>
-              <a:uLnTx/>
-              <a:uFillTx/>
               <a:latin typeface="Franklin Gothic Medium" pitchFamily="34" charset="0"/>
             </a:endParaRPr>
           </a:p>
@@ -7146,7 +7774,7 @@
         </p:nvSpPr>
         <p:spPr bwMode="auto">
           <a:xfrm>
-            <a:off x="5211420" y="1544833"/>
+            <a:off x="6735421" y="1544833"/>
             <a:ext cx="503453" cy="5120640"/>
           </a:xfrm>
           <a:prstGeom prst="roundRect">
@@ -7179,27 +7807,16 @@
           </a:bodyPr>
           <a:lstStyle/>
           <a:p>
-            <a:pPr marL="0" marR="0" lvl="0" indent="0" algn="l" defTabSz="914400" rtl="0" eaLnBrk="1" fontAlgn="base" latinLnBrk="0" hangingPunct="1">
-              <a:lnSpc>
-                <a:spcPct val="100000"/>
-              </a:lnSpc>
+            <a:pPr defTabSz="914400" fontAlgn="base">
               <a:spcBef>
                 <a:spcPct val="0"/>
               </a:spcBef>
               <a:spcAft>
                 <a:spcPct val="0"/>
               </a:spcAft>
-              <a:buClrTx/>
-              <a:buSzTx/>
-              <a:buFontTx/>
-              <a:buNone/>
-              <a:tabLst/>
               <a:defRPr/>
             </a:pPr>
-            <a:endParaRPr kumimoji="0" lang="en-US" sz="3200" b="1" i="0" u="none" strike="noStrike" kern="0" cap="none" spc="0" normalizeH="0" baseline="0" noProof="0" smtClean="0">
-              <a:ln>
-                <a:noFill/>
-              </a:ln>
+            <a:endParaRPr lang="en-US" sz="3200" b="1" kern="0">
               <a:solidFill>
                 <a:srgbClr val="FFFFFF"/>
               </a:solidFill>
@@ -7210,8 +7827,6 @@
                   </a:srgbClr>
                 </a:outerShdw>
               </a:effectLst>
-              <a:uLnTx/>
-              <a:uFillTx/>
               <a:latin typeface="Franklin Gothic Medium" pitchFamily="34" charset="0"/>
             </a:endParaRPr>
           </a:p>
@@ -7464,6 +8079,25 @@
           </a:p>
         </p:txBody>
       </p:sp>
+      <p:sp>
+        <p:nvSpPr>
+          <p:cNvPr id="3" name="Text Placeholder 2"/>
+          <p:cNvSpPr>
+            <a:spLocks noGrp="1"/>
+          </p:cNvSpPr>
+          <p:nvPr>
+            <p:ph type="body" idx="1"/>
+          </p:nvPr>
+        </p:nvSpPr>
+        <p:spPr/>
+        <p:txBody>
+          <a:bodyPr/>
+          <a:lstStyle/>
+          <a:p>
+            <a:endParaRPr lang="en-US"/>
+          </a:p>
+        </p:txBody>
+      </p:sp>
     </p:spTree>
     <p:extLst>
       <p:ext uri="{BB962C8B-B14F-4D97-AF65-F5344CB8AC3E}">
@@ -7517,16 +8151,8 @@
           <a:lstStyle/>
           <a:p>
             <a:r>
-              <a:rPr lang="en-US" dirty="0" smtClean="0"/>
-              <a:t>What is </a:t>
-            </a:r>
-            <a:r>
-              <a:rPr lang="en-US" dirty="0" err="1" smtClean="0"/>
-              <a:t>NoSQL</a:t>
-            </a:r>
-            <a:r>
-              <a:rPr lang="en-US" dirty="0" smtClean="0"/>
-              <a:t>?</a:t>
+              <a:rPr lang="en-US" smtClean="0"/>
+              <a:t>What is NoSQL?</a:t>
             </a:r>
             <a:endParaRPr lang="en-US" dirty="0"/>
           </a:p>
@@ -7548,26 +8174,27 @@
           <a:lstStyle/>
           <a:p>
             <a:r>
-              <a:rPr lang="en-US" dirty="0" smtClean="0"/>
+              <a:rPr lang="en-US" smtClean="0"/>
               <a:t>Not relational</a:t>
             </a:r>
           </a:p>
           <a:p>
-            <a:r>
-              <a:rPr lang="en-US" dirty="0" smtClean="0"/>
+            <a:endParaRPr lang="en-US" smtClean="0"/>
+          </a:p>
+          <a:p>
+            <a:r>
+              <a:rPr lang="en-US" smtClean="0"/>
               <a:t>Built for scale</a:t>
             </a:r>
           </a:p>
           <a:p>
-            <a:r>
-              <a:rPr lang="en-US" dirty="0" smtClean="0"/>
-              <a:t>Typically </a:t>
-            </a:r>
-            <a:r>
-              <a:rPr lang="en-US" dirty="0" err="1" smtClean="0"/>
-              <a:t>schemaless</a:t>
-            </a:r>
-            <a:endParaRPr lang="en-US" dirty="0" smtClean="0"/>
+            <a:endParaRPr lang="en-US" smtClean="0"/>
+          </a:p>
+          <a:p>
+            <a:r>
+              <a:rPr lang="en-US" smtClean="0"/>
+              <a:t>Typically schemaless</a:t>
+            </a:r>
           </a:p>
           <a:p>
             <a:endParaRPr lang="en-US" dirty="0"/>
@@ -7661,7 +8288,7 @@
         </p:blipFill>
         <p:spPr bwMode="auto">
           <a:xfrm>
-            <a:off x="1083743" y="1509183"/>
+            <a:off x="2607743" y="1509183"/>
             <a:ext cx="6858000" cy="5143500"/>
           </a:xfrm>
           <a:prstGeom prst="rect">
@@ -7780,15 +8407,14 @@
               </a:ext>
             </a:extLst>
           </a:blip>
-          <a:srcRect/>
           <a:stretch>
             <a:fillRect/>
           </a:stretch>
         </p:blipFill>
         <p:spPr bwMode="auto">
           <a:xfrm>
-            <a:off x="1263497" y="1600200"/>
-            <a:ext cx="6617005" cy="4876800"/>
+            <a:off x="2763734" y="1572128"/>
+            <a:ext cx="6470801" cy="4769046"/>
           </a:xfrm>
           <a:prstGeom prst="rect">
             <a:avLst/>
@@ -7890,33 +8516,14 @@
       </p:sp>
       <p:sp>
         <p:nvSpPr>
-          <p:cNvPr id="3" name="Content Placeholder 2"/>
-          <p:cNvSpPr>
-            <a:spLocks noGrp="1"/>
-          </p:cNvSpPr>
-          <p:nvPr>
-            <p:ph idx="1"/>
-          </p:nvPr>
-        </p:nvSpPr>
-        <p:spPr/>
-        <p:txBody>
-          <a:bodyPr/>
-          <a:lstStyle/>
-          <a:p>
-            <a:endParaRPr lang="en-US"/>
-          </a:p>
-        </p:txBody>
-      </p:sp>
-      <p:sp>
-        <p:nvSpPr>
           <p:cNvPr id="4" name="Rectangle 3"/>
           <p:cNvSpPr/>
           <p:nvPr/>
         </p:nvSpPr>
         <p:spPr>
           <a:xfrm>
-            <a:off x="2209800" y="2181225"/>
-            <a:ext cx="4610100" cy="3590925"/>
+            <a:off x="2933323" y="1690688"/>
+            <a:ext cx="5410577" cy="4081463"/>
           </a:xfrm>
           <a:prstGeom prst="rect">
             <a:avLst/>
@@ -7943,15 +8550,15 @@
           <a:lstStyle/>
           <a:p>
             <a:r>
-              <a:rPr lang="en-US" dirty="0" smtClean="0"/>
+              <a:rPr lang="en-US" dirty="0"/>
               <a:t>[Bucket = </a:t>
             </a:r>
             <a:r>
-              <a:rPr lang="en-US" dirty="0" err="1" smtClean="0"/>
+              <a:rPr lang="en-US" dirty="0" err="1"/>
               <a:t>AspNetSession</a:t>
             </a:r>
             <a:r>
-              <a:rPr lang="en-US" dirty="0" smtClean="0"/>
+              <a:rPr lang="en-US" dirty="0"/>
               <a:t>]</a:t>
             </a:r>
             <a:endParaRPr lang="en-US" dirty="0"/>
@@ -7966,8 +8573,8 @@
         </p:nvSpPr>
         <p:spPr>
           <a:xfrm flipH="1">
-            <a:off x="2466975" y="2562225"/>
-            <a:ext cx="4152900" cy="2933700"/>
+            <a:off x="3241141" y="2055137"/>
+            <a:ext cx="4902734" cy="3440788"/>
           </a:xfrm>
           <a:prstGeom prst="rect">
             <a:avLst/>
@@ -7994,15 +8601,15 @@
           <a:lstStyle/>
           <a:p>
             <a:r>
-              <a:rPr lang="en-US" dirty="0" smtClean="0"/>
+              <a:rPr lang="en-US" dirty="0"/>
               <a:t>[Key = </a:t>
             </a:r>
             <a:r>
-              <a:rPr lang="en-US" dirty="0" err="1" smtClean="0"/>
+              <a:rPr lang="en-US" dirty="0" err="1"/>
               <a:t>AspNetSession</a:t>
             </a:r>
             <a:r>
-              <a:rPr lang="en-US" dirty="0" smtClean="0"/>
+              <a:rPr lang="en-US" dirty="0"/>
               <a:t>/8uhwe9fjs93]</a:t>
             </a:r>
             <a:endParaRPr lang="en-US" dirty="0"/>
@@ -8017,8 +8624,8 @@
         </p:nvSpPr>
         <p:spPr>
           <a:xfrm>
-            <a:off x="2733675" y="2981325"/>
-            <a:ext cx="3600450" cy="2324100"/>
+            <a:off x="3494638" y="2444436"/>
+            <a:ext cx="4363487" cy="2860989"/>
           </a:xfrm>
           <a:prstGeom prst="rect">
             <a:avLst/>
@@ -8046,15 +8653,15 @@
           <a:p>
             <a:pPr algn="ctr"/>
             <a:r>
-              <a:rPr lang="en-US" dirty="0" smtClean="0"/>
+              <a:rPr lang="en-US" dirty="0"/>
               <a:t>[Value = </a:t>
             </a:r>
             <a:r>
-              <a:rPr lang="en-US" dirty="0" err="1" smtClean="0"/>
+              <a:rPr lang="en-US" dirty="0" err="1"/>
               <a:t>RedisSessionState</a:t>
             </a:r>
             <a:r>
-              <a:rPr lang="en-US" dirty="0" smtClean="0"/>
+              <a:rPr lang="en-US" dirty="0"/>
               <a:t>]</a:t>
             </a:r>
             <a:endParaRPr lang="en-US" dirty="0"/>
@@ -8071,6 +8678,13 @@
   <p:clrMapOvr>
     <a:masterClrMapping/>
   </p:clrMapOvr>
+  <p:timing>
+    <p:tnLst>
+      <p:par>
+        <p:cTn id="1" dur="indefinite" restart="never" nodeType="tmRoot"/>
+      </p:par>
+    </p:tnLst>
+  </p:timing>
 </p:sld>
 </file>
 
@@ -8156,7 +8770,7 @@
         </p:blipFill>
         <p:spPr bwMode="auto">
           <a:xfrm>
-            <a:off x="814388" y="1533524"/>
+            <a:off x="2338389" y="1533525"/>
             <a:ext cx="7729537" cy="5175789"/>
           </a:xfrm>
           <a:prstGeom prst="rect">
@@ -8207,6 +8821,13 @@
   <p:clrMapOvr>
     <a:masterClrMapping/>
   </p:clrMapOvr>
+  <p:timing>
+    <p:tnLst>
+      <p:par>
+        <p:cTn id="1" dur="indefinite" restart="never" nodeType="tmRoot"/>
+      </p:par>
+    </p:tnLst>
+  </p:timing>
 </p:sld>
 </file>
 
@@ -8237,7 +8858,12 @@
             <p:ph type="title"/>
           </p:nvPr>
         </p:nvSpPr>
-        <p:spPr/>
+        <p:spPr>
+          <a:xfrm>
+            <a:off x="838200" y="365125"/>
+            <a:ext cx="10515600" cy="1325563"/>
+          </a:xfrm>
+        </p:spPr>
         <p:txBody>
           <a:bodyPr/>
           <a:lstStyle/>
@@ -8258,7 +8884,7 @@
         </p:nvSpPr>
         <p:spPr>
           <a:xfrm>
-            <a:off x="1495424" y="3000375"/>
+            <a:off x="3019424" y="3000376"/>
             <a:ext cx="1743076" cy="447675"/>
           </a:xfrm>
           <a:prstGeom prst="rect">
@@ -8287,10 +8913,10 @@
           <a:p>
             <a:pPr algn="ctr"/>
             <a:r>
-              <a:rPr lang="en-US" dirty="0" smtClean="0"/>
+              <a:rPr lang="en-US" sz="1400" dirty="0"/>
               <a:t>ProductId:771</a:t>
             </a:r>
-            <a:endParaRPr lang="en-US" dirty="0"/>
+            <a:endParaRPr lang="en-US" sz="1400" dirty="0"/>
           </a:p>
         </p:txBody>
       </p:sp>
@@ -8302,7 +8928,7 @@
         </p:nvSpPr>
         <p:spPr>
           <a:xfrm>
-            <a:off x="4076699" y="1933575"/>
+            <a:off x="5600699" y="1933576"/>
             <a:ext cx="1743076" cy="447675"/>
           </a:xfrm>
           <a:prstGeom prst="rect">
@@ -8331,10 +8957,10 @@
           <a:p>
             <a:pPr algn="ctr"/>
             <a:r>
-              <a:rPr lang="en-US" dirty="0" smtClean="0"/>
+              <a:rPr lang="en-US" sz="1400" dirty="0"/>
               <a:t>ProductId:23</a:t>
             </a:r>
-            <a:endParaRPr lang="en-US" dirty="0"/>
+            <a:endParaRPr lang="en-US" sz="1400" dirty="0"/>
           </a:p>
         </p:txBody>
       </p:sp>
@@ -8346,7 +8972,7 @@
         </p:nvSpPr>
         <p:spPr>
           <a:xfrm>
-            <a:off x="3390900" y="5229225"/>
+            <a:off x="4914900" y="5229226"/>
             <a:ext cx="1743076" cy="447675"/>
           </a:xfrm>
           <a:prstGeom prst="rect">
@@ -8375,10 +9001,10 @@
           <a:p>
             <a:pPr algn="ctr"/>
             <a:r>
-              <a:rPr lang="en-US" dirty="0" smtClean="0"/>
+              <a:rPr lang="en-US" sz="1400" dirty="0"/>
               <a:t>ProductId:65</a:t>
             </a:r>
-            <a:endParaRPr lang="en-US" dirty="0"/>
+            <a:endParaRPr lang="en-US" sz="1400" dirty="0"/>
           </a:p>
         </p:txBody>
       </p:sp>
@@ -8390,7 +9016,7 @@
         </p:nvSpPr>
         <p:spPr>
           <a:xfrm>
-            <a:off x="4533899" y="3605212"/>
+            <a:off x="6057899" y="3605213"/>
             <a:ext cx="1743076" cy="447675"/>
           </a:xfrm>
           <a:prstGeom prst="rect">
@@ -8419,10 +9045,10 @@
           <a:p>
             <a:pPr algn="ctr"/>
             <a:r>
-              <a:rPr lang="en-US" dirty="0" smtClean="0"/>
+              <a:rPr lang="en-US" sz="1400" dirty="0"/>
               <a:t>ProductId:989</a:t>
             </a:r>
-            <a:endParaRPr lang="en-US" dirty="0"/>
+            <a:endParaRPr lang="en-US" sz="1400" dirty="0"/>
           </a:p>
         </p:txBody>
       </p:sp>
@@ -8434,7 +9060,7 @@
         </p:nvSpPr>
         <p:spPr>
           <a:xfrm>
-            <a:off x="6067424" y="2705100"/>
+            <a:off x="7591424" y="2705101"/>
             <a:ext cx="1743076" cy="447675"/>
           </a:xfrm>
           <a:prstGeom prst="rect">
@@ -8463,10 +9089,10 @@
           <a:p>
             <a:pPr algn="ctr"/>
             <a:r>
-              <a:rPr lang="en-US" dirty="0" smtClean="0"/>
+              <a:rPr lang="en-US" sz="1400" dirty="0"/>
               <a:t>ProductId:24</a:t>
             </a:r>
-            <a:endParaRPr lang="en-US" dirty="0"/>
+            <a:endParaRPr lang="en-US" sz="1400" dirty="0"/>
           </a:p>
         </p:txBody>
       </p:sp>
@@ -8481,13 +9107,13 @@
         </p:nvCxnSpPr>
         <p:spPr>
           <a:xfrm flipV="1">
-            <a:off x="2366962" y="2157413"/>
+            <a:off x="3890963" y="2157413"/>
             <a:ext cx="1709737" cy="842962"/>
           </a:xfrm>
           <a:prstGeom prst="straightConnector1">
             <a:avLst/>
           </a:prstGeom>
-          <a:ln>
+          <a:ln w="38100">
             <a:tailEnd type="arrow"/>
           </a:ln>
         </p:spPr>
@@ -8517,13 +9143,13 @@
         </p:nvCxnSpPr>
         <p:spPr>
           <a:xfrm>
-            <a:off x="4948237" y="2381250"/>
+            <a:off x="6472237" y="2381250"/>
             <a:ext cx="457200" cy="1223962"/>
           </a:xfrm>
           <a:prstGeom prst="straightConnector1">
             <a:avLst/>
           </a:prstGeom>
-          <a:ln>
+          <a:ln w="38100">
             <a:tailEnd type="arrow"/>
           </a:ln>
         </p:spPr>
@@ -8553,13 +9179,13 @@
         </p:nvCxnSpPr>
         <p:spPr>
           <a:xfrm flipH="1">
-            <a:off x="4262438" y="2381250"/>
+            <a:off x="5786439" y="2381251"/>
             <a:ext cx="685799" cy="2847975"/>
           </a:xfrm>
           <a:prstGeom prst="straightConnector1">
             <a:avLst/>
           </a:prstGeom>
-          <a:ln>
+          <a:ln w="38100">
             <a:tailEnd type="arrow"/>
           </a:ln>
         </p:spPr>
@@ -8589,13 +9215,13 @@
         </p:nvCxnSpPr>
         <p:spPr>
           <a:xfrm flipH="1" flipV="1">
-            <a:off x="5819775" y="2157413"/>
+            <a:off x="7343776" y="2157414"/>
             <a:ext cx="1119187" cy="547687"/>
           </a:xfrm>
           <a:prstGeom prst="straightConnector1">
             <a:avLst/>
           </a:prstGeom>
-          <a:ln>
+          <a:ln w="38100">
             <a:tailEnd type="arrow"/>
           </a:ln>
         </p:spPr>
@@ -8625,13 +9251,13 @@
         </p:nvCxnSpPr>
         <p:spPr>
           <a:xfrm flipH="1" flipV="1">
-            <a:off x="2366962" y="3448050"/>
+            <a:off x="3890962" y="3448051"/>
             <a:ext cx="1023938" cy="2005013"/>
           </a:xfrm>
           <a:prstGeom prst="straightConnector1">
             <a:avLst/>
           </a:prstGeom>
-          <a:ln>
+          <a:ln w="38100">
             <a:tailEnd type="arrow"/>
           </a:ln>
         </p:spPr>
@@ -8660,6 +9286,13 @@
   <p:clrMapOvr>
     <a:masterClrMapping/>
   </p:clrMapOvr>
+  <p:timing>
+    <p:tnLst>
+      <p:par>
+        <p:cTn id="1" dur="indefinite" restart="never" nodeType="tmRoot"/>
+      </p:par>
+    </p:tnLst>
+  </p:timing>
 </p:sld>
 </file>
 
@@ -8696,10 +9329,29 @@
           <a:lstStyle/>
           <a:p>
             <a:r>
-              <a:rPr lang="en-US" smtClean="0"/>
+              <a:rPr lang="en-US" dirty="0" smtClean="0"/>
               <a:t>Challenges</a:t>
             </a:r>
             <a:endParaRPr lang="en-US" dirty="0"/>
+          </a:p>
+        </p:txBody>
+      </p:sp>
+      <p:sp>
+        <p:nvSpPr>
+          <p:cNvPr id="3" name="Text Placeholder 2"/>
+          <p:cNvSpPr>
+            <a:spLocks noGrp="1"/>
+          </p:cNvSpPr>
+          <p:nvPr>
+            <p:ph type="body" idx="1"/>
+          </p:nvPr>
+        </p:nvSpPr>
+        <p:spPr/>
+        <p:txBody>
+          <a:bodyPr/>
+          <a:lstStyle/>
+          <a:p>
+            <a:endParaRPr lang="en-US"/>
           </a:p>
         </p:txBody>
       </p:sp>
@@ -8805,7 +9457,7 @@
         </p:blipFill>
         <p:spPr bwMode="auto">
           <a:xfrm>
-            <a:off x="2286000" y="1750594"/>
+            <a:off x="3810001" y="1750595"/>
             <a:ext cx="4588933" cy="2022753"/>
           </a:xfrm>
           <a:prstGeom prst="rect">
@@ -8869,7 +9521,7 @@
         </p:blipFill>
         <p:spPr bwMode="auto">
           <a:xfrm>
-            <a:off x="848255" y="4179889"/>
+            <a:off x="2372256" y="4179890"/>
             <a:ext cx="3400425" cy="885825"/>
           </a:xfrm>
           <a:prstGeom prst="rect">
@@ -8933,7 +9585,7 @@
         </p:blipFill>
         <p:spPr bwMode="auto">
           <a:xfrm>
-            <a:off x="4729163" y="5396442"/>
+            <a:off x="6253164" y="5396443"/>
             <a:ext cx="3190875" cy="885825"/>
           </a:xfrm>
           <a:prstGeom prst="rect">
@@ -8996,206 +9648,56 @@
 
 <file path=ppt/tags/tag1.xml><?xml version="1.0" encoding="utf-8"?>
 <p:tagLst xmlns:a="http://schemas.openxmlformats.org/drawingml/2006/main" xmlns:r="http://schemas.openxmlformats.org/officeDocument/2006/relationships" xmlns:p="http://schemas.openxmlformats.org/presentationml/2006/main">
-  <p:tag name="DVSHAPEID" val="3PeF0pfZpjxb4E6eXY8RTT"/>
+  <p:tag name="DVSHAPEID" val="nyqJJ7TVybia62ONwysKaM"/>
 </p:tagLst>
 </file>
 
-<file path=ppt/tags/tag10.xml><?xml version="1.0" encoding="utf-8"?>
+<file path=ppt/tags/tag2.xml><?xml version="1.0" encoding="utf-8"?>
+<p:tagLst xmlns:a="http://schemas.openxmlformats.org/drawingml/2006/main" xmlns:r="http://schemas.openxmlformats.org/officeDocument/2006/relationships" xmlns:p="http://schemas.openxmlformats.org/presentationml/2006/main">
+  <p:tag name="DVSHAPEID" val="pRYDDVOyZSvYcPCgmo8HGX"/>
+</p:tagLst>
+</file>
+
+<file path=ppt/tags/tag3.xml><?xml version="1.0" encoding="utf-8"?>
 <p:tagLst xmlns:a="http://schemas.openxmlformats.org/drawingml/2006/main" xmlns:r="http://schemas.openxmlformats.org/officeDocument/2006/relationships" xmlns:p="http://schemas.openxmlformats.org/presentationml/2006/main">
   <p:tag name="DVSHAPEID" val="z4LoIctk0mYSUZbbRn9ct8"/>
 </p:tagLst>
 </file>
 
-<file path=ppt/tags/tag11.xml><?xml version="1.0" encoding="utf-8"?>
+<file path=ppt/tags/tag4.xml><?xml version="1.0" encoding="utf-8"?>
 <p:tagLst xmlns:a="http://schemas.openxmlformats.org/drawingml/2006/main" xmlns:r="http://schemas.openxmlformats.org/officeDocument/2006/relationships" xmlns:p="http://schemas.openxmlformats.org/presentationml/2006/main">
-  <p:tag name="DVSHAPEID" val="ZyMwWG1KoyrshURfdC5ER9"/>
+  <p:tag name="DVSHAPEID" val="pRYDDVOyZSvYcPCgmo8HGX"/>
 </p:tagLst>
 </file>
 
-<file path=ppt/tags/tag12.xml><?xml version="1.0" encoding="utf-8"?>
+<file path=ppt/tags/tag5.xml><?xml version="1.0" encoding="utf-8"?>
 <p:tagLst xmlns:a="http://schemas.openxmlformats.org/drawingml/2006/main" xmlns:r="http://schemas.openxmlformats.org/officeDocument/2006/relationships" xmlns:p="http://schemas.openxmlformats.org/presentationml/2006/main">
-  <p:tag name="DVSHAPEID" val="ZkVC4axKyuuq4dBcfMjgXp"/>
+  <p:tag name="DVSHAPEID" val="z4LoIctk0mYSUZbbRn9ct8"/>
 </p:tagLst>
 </file>
 
-<file path=ppt/tags/tag13.xml><?xml version="1.0" encoding="utf-8"?>
-<p:tagLst xmlns:a="http://schemas.openxmlformats.org/drawingml/2006/main" xmlns:r="http://schemas.openxmlformats.org/officeDocument/2006/relationships" xmlns:p="http://schemas.openxmlformats.org/presentationml/2006/main">
-  <p:tag name="DVSHAPEID" val="qsHgjBax6OhQysAjCQdD0X"/>
-</p:tagLst>
-</file>
-
-<file path=ppt/tags/tag14.xml><?xml version="1.0" encoding="utf-8"?>
-<p:tagLst xmlns:a="http://schemas.openxmlformats.org/drawingml/2006/main" xmlns:r="http://schemas.openxmlformats.org/officeDocument/2006/relationships" xmlns:p="http://schemas.openxmlformats.org/presentationml/2006/main">
-  <p:tag name="DVSHAPEID" val="XQQED1mikBbATtVNQVA0nF"/>
-</p:tagLst>
-</file>
-
-<file path=ppt/tags/tag15.xml><?xml version="1.0" encoding="utf-8"?>
-<p:tagLst xmlns:a="http://schemas.openxmlformats.org/drawingml/2006/main" xmlns:r="http://schemas.openxmlformats.org/officeDocument/2006/relationships" xmlns:p="http://schemas.openxmlformats.org/presentationml/2006/main">
-  <p:tag name="DVSHAPEID" val="9dF9BVat3jptuQqFY8aNtG"/>
-</p:tagLst>
-</file>
-
-<file path=ppt/tags/tag16.xml><?xml version="1.0" encoding="utf-8"?>
-<p:tagLst xmlns:a="http://schemas.openxmlformats.org/drawingml/2006/main" xmlns:r="http://schemas.openxmlformats.org/officeDocument/2006/relationships" xmlns:p="http://schemas.openxmlformats.org/presentationml/2006/main">
-  <p:tag name="DVSHAPEID" val="EYz7oOZh3ZziHCYuqr8RxR"/>
-</p:tagLst>
-</file>
-
-<file path=ppt/tags/tag17.xml><?xml version="1.0" encoding="utf-8"?>
-<p:tagLst xmlns:a="http://schemas.openxmlformats.org/drawingml/2006/main" xmlns:r="http://schemas.openxmlformats.org/officeDocument/2006/relationships" xmlns:p="http://schemas.openxmlformats.org/presentationml/2006/main">
-  <p:tag name="DVSHAPEID" val="bqZ4nbXrQAbtyHzuwltLgp"/>
-</p:tagLst>
-</file>
-
-<file path=ppt/tags/tag18.xml><?xml version="1.0" encoding="utf-8"?>
-<p:tagLst xmlns:a="http://schemas.openxmlformats.org/drawingml/2006/main" xmlns:r="http://schemas.openxmlformats.org/officeDocument/2006/relationships" xmlns:p="http://schemas.openxmlformats.org/presentationml/2006/main">
-  <p:tag name="DVSHAPEID" val="Tc9NGtIIFC8MM97krOkB9Z"/>
-</p:tagLst>
-</file>
-
-<file path=ppt/tags/tag19.xml><?xml version="1.0" encoding="utf-8"?>
-<p:tagLst xmlns:a="http://schemas.openxmlformats.org/drawingml/2006/main" xmlns:r="http://schemas.openxmlformats.org/officeDocument/2006/relationships" xmlns:p="http://schemas.openxmlformats.org/presentationml/2006/main">
-  <p:tag name="DVSHAPEID" val="6e3hUVUNnMBLwNVzutJ7Uy"/>
-</p:tagLst>
-</file>
-
-<file path=ppt/tags/tag2.xml><?xml version="1.0" encoding="utf-8"?>
-<p:tagLst xmlns:a="http://schemas.openxmlformats.org/drawingml/2006/main" xmlns:r="http://schemas.openxmlformats.org/officeDocument/2006/relationships" xmlns:p="http://schemas.openxmlformats.org/presentationml/2006/main">
-  <p:tag name="DVSHAPEID" val="IcRcSHxF9KLXD8CoBkQECk"/>
-</p:tagLst>
-</file>
-
-<file path=ppt/tags/tag20.xml><?xml version="1.0" encoding="utf-8"?>
-<p:tagLst xmlns:a="http://schemas.openxmlformats.org/drawingml/2006/main" xmlns:r="http://schemas.openxmlformats.org/officeDocument/2006/relationships" xmlns:p="http://schemas.openxmlformats.org/presentationml/2006/main">
-  <p:tag name="DVSHAPEID" val="lLUqmcTFqEgU5VJpyNORel"/>
-</p:tagLst>
-</file>
-
-<file path=ppt/tags/tag21.xml><?xml version="1.0" encoding="utf-8"?>
-<p:tagLst xmlns:a="http://schemas.openxmlformats.org/drawingml/2006/main" xmlns:r="http://schemas.openxmlformats.org/officeDocument/2006/relationships" xmlns:p="http://schemas.openxmlformats.org/presentationml/2006/main">
-  <p:tag name="DVSHAPEID" val="b1CkpRjRS14xSimuyITHlX"/>
-</p:tagLst>
-</file>
-
-<file path=ppt/tags/tag22.xml><?xml version="1.0" encoding="utf-8"?>
-<p:tagLst xmlns:a="http://schemas.openxmlformats.org/drawingml/2006/main" xmlns:r="http://schemas.openxmlformats.org/officeDocument/2006/relationships" xmlns:p="http://schemas.openxmlformats.org/presentationml/2006/main">
-  <p:tag name="DVSHAPEID" val="vBHZQ4UWj3kZATN1N2lzLe"/>
-</p:tagLst>
-</file>
-
-<file path=ppt/tags/tag23.xml><?xml version="1.0" encoding="utf-8"?>
-<p:tagLst xmlns:a="http://schemas.openxmlformats.org/drawingml/2006/main" xmlns:r="http://schemas.openxmlformats.org/officeDocument/2006/relationships" xmlns:p="http://schemas.openxmlformats.org/presentationml/2006/main">
-  <p:tag name="DVSHAPEID" val="Qx2r24e5YxZdw1Cp1fWWI1"/>
-</p:tagLst>
-</file>
-
-<file path=ppt/tags/tag24.xml><?xml version="1.0" encoding="utf-8"?>
-<p:tagLst xmlns:a="http://schemas.openxmlformats.org/drawingml/2006/main" xmlns:r="http://schemas.openxmlformats.org/officeDocument/2006/relationships" xmlns:p="http://schemas.openxmlformats.org/presentationml/2006/main">
-  <p:tag name="DVSHAPEID" val="dTHtGxURlMbgLaXo1QId4M"/>
-</p:tagLst>
-</file>
-
-<file path=ppt/tags/tag25.xml><?xml version="1.0" encoding="utf-8"?>
-<p:tagLst xmlns:a="http://schemas.openxmlformats.org/drawingml/2006/main" xmlns:r="http://schemas.openxmlformats.org/officeDocument/2006/relationships" xmlns:p="http://schemas.openxmlformats.org/presentationml/2006/main">
-  <p:tag name="DVSHAPEID" val="ZnmMoo06DPwPj8KzoHb7bd"/>
-</p:tagLst>
-</file>
-
-<file path=ppt/tags/tag26.xml><?xml version="1.0" encoding="utf-8"?>
-<p:tagLst xmlns:a="http://schemas.openxmlformats.org/drawingml/2006/main" xmlns:r="http://schemas.openxmlformats.org/officeDocument/2006/relationships" xmlns:p="http://schemas.openxmlformats.org/presentationml/2006/main">
-  <p:tag name="DVSHAPEID" val="2fgsrCd5euWqUj6U8wQf9m"/>
-</p:tagLst>
-</file>
-
-<file path=ppt/tags/tag27.xml><?xml version="1.0" encoding="utf-8"?>
-<p:tagLst xmlns:a="http://schemas.openxmlformats.org/drawingml/2006/main" xmlns:r="http://schemas.openxmlformats.org/officeDocument/2006/relationships" xmlns:p="http://schemas.openxmlformats.org/presentationml/2006/main">
-  <p:tag name="DVSHAPEID" val="KWROEss02XBLl7wWWnTxB1"/>
-</p:tagLst>
-</file>
-
-<file path=ppt/tags/tag28.xml><?xml version="1.0" encoding="utf-8"?>
-<p:tagLst xmlns:a="http://schemas.openxmlformats.org/drawingml/2006/main" xmlns:r="http://schemas.openxmlformats.org/officeDocument/2006/relationships" xmlns:p="http://schemas.openxmlformats.org/presentationml/2006/main">
-  <p:tag name="DVSHAPEID" val="SSeqstyEgW4FvjBDYLDdsY"/>
-</p:tagLst>
-</file>
-
-<file path=ppt/tags/tag29.xml><?xml version="1.0" encoding="utf-8"?>
-<p:tagLst xmlns:a="http://schemas.openxmlformats.org/drawingml/2006/main" xmlns:r="http://schemas.openxmlformats.org/officeDocument/2006/relationships" xmlns:p="http://schemas.openxmlformats.org/presentationml/2006/main">
-  <p:tag name="DVSHAPEID" val="P8YZncztmCKI3YAdZYsnGF"/>
-</p:tagLst>
-</file>
-
-<file path=ppt/tags/tag3.xml><?xml version="1.0" encoding="utf-8"?>
-<p:tagLst xmlns:a="http://schemas.openxmlformats.org/drawingml/2006/main" xmlns:r="http://schemas.openxmlformats.org/officeDocument/2006/relationships" xmlns:p="http://schemas.openxmlformats.org/presentationml/2006/main">
-  <p:tag name="DVSHAPEID" val="nyqJJ7TVybia62ONwysKaM"/>
-</p:tagLst>
-</file>
-
-<file path=ppt/tags/tag30.xml><?xml version="1.0" encoding="utf-8"?>
-<p:tagLst xmlns:a="http://schemas.openxmlformats.org/drawingml/2006/main" xmlns:r="http://schemas.openxmlformats.org/officeDocument/2006/relationships" xmlns:p="http://schemas.openxmlformats.org/presentationml/2006/main">
-  <p:tag name="DVSHAPEID" val="HFBcljo7TnzT36st5m4NAs"/>
-</p:tagLst>
-</file>
-
-<file path=ppt/tags/tag31.xml><?xml version="1.0" encoding="utf-8"?>
+<file path=ppt/tags/tag6.xml><?xml version="1.0" encoding="utf-8"?>
 <p:tagLst xmlns:a="http://schemas.openxmlformats.org/drawingml/2006/main" xmlns:r="http://schemas.openxmlformats.org/officeDocument/2006/relationships" xmlns:p="http://schemas.openxmlformats.org/presentationml/2006/main">
   <p:tag name="DVSECTIONID" val="ULJKTtTuA1JYcmiIHNUWnZ"/>
 </p:tagLst>
 </file>
 
-<file path=ppt/tags/tag32.xml><?xml version="1.0" encoding="utf-8"?>
+<file path=ppt/tags/tag7.xml><?xml version="1.0" encoding="utf-8"?>
 <p:tagLst xmlns:a="http://schemas.openxmlformats.org/drawingml/2006/main" xmlns:r="http://schemas.openxmlformats.org/officeDocument/2006/relationships" xmlns:p="http://schemas.openxmlformats.org/presentationml/2006/main">
   <p:tag name="DVSHAPEID" val="0el361ATYxVn7CIhxUw3rP"/>
 </p:tagLst>
 </file>
 
-<file path=ppt/tags/tag33.xml><?xml version="1.0" encoding="utf-8"?>
+<file path=ppt/tags/tag8.xml><?xml version="1.0" encoding="utf-8"?>
 <p:tagLst xmlns:a="http://schemas.openxmlformats.org/drawingml/2006/main" xmlns:r="http://schemas.openxmlformats.org/officeDocument/2006/relationships" xmlns:p="http://schemas.openxmlformats.org/presentationml/2006/main">
   <p:tag name="DVSHAPEID" val="9GXR3BK6E2EUKvoPmRUH3b"/>
 </p:tagLst>
 </file>
 
-<file path=ppt/tags/tag4.xml><?xml version="1.0" encoding="utf-8"?>
-<p:tagLst xmlns:a="http://schemas.openxmlformats.org/drawingml/2006/main" xmlns:r="http://schemas.openxmlformats.org/officeDocument/2006/relationships" xmlns:p="http://schemas.openxmlformats.org/presentationml/2006/main">
-  <p:tag name="DVSHAPEID" val="p71XBznN0egnPiL9YpLecA"/>
-</p:tagLst>
-</file>
-
-<file path=ppt/tags/tag5.xml><?xml version="1.0" encoding="utf-8"?>
-<p:tagLst xmlns:a="http://schemas.openxmlformats.org/drawingml/2006/main" xmlns:r="http://schemas.openxmlformats.org/officeDocument/2006/relationships" xmlns:p="http://schemas.openxmlformats.org/presentationml/2006/main">
-  <p:tag name="DVSHAPEID" val="Et1AzNOicRaB9jILwjyKa3"/>
-</p:tagLst>
-</file>
-
-<file path=ppt/tags/tag6.xml><?xml version="1.0" encoding="utf-8"?>
-<p:tagLst xmlns:a="http://schemas.openxmlformats.org/drawingml/2006/main" xmlns:r="http://schemas.openxmlformats.org/officeDocument/2006/relationships" xmlns:p="http://schemas.openxmlformats.org/presentationml/2006/main">
-  <p:tag name="DVSHAPEID" val="TJdv1nA2YWAPsyW1ZAZI2o"/>
-</p:tagLst>
-</file>
-
-<file path=ppt/tags/tag7.xml><?xml version="1.0" encoding="utf-8"?>
-<p:tagLst xmlns:a="http://schemas.openxmlformats.org/drawingml/2006/main" xmlns:r="http://schemas.openxmlformats.org/officeDocument/2006/relationships" xmlns:p="http://schemas.openxmlformats.org/presentationml/2006/main">
-  <p:tag name="DVSHAPEID" val="cd9sqcTsFrpBzin4LqI9Te"/>
-</p:tagLst>
-</file>
-
-<file path=ppt/tags/tag8.xml><?xml version="1.0" encoding="utf-8"?>
-<p:tagLst xmlns:a="http://schemas.openxmlformats.org/drawingml/2006/main" xmlns:r="http://schemas.openxmlformats.org/officeDocument/2006/relationships" xmlns:p="http://schemas.openxmlformats.org/presentationml/2006/main">
-  <p:tag name="DVSHAPEID" val="1jQaPujYLs1vwZmzXn9wg8"/>
-</p:tagLst>
-</file>
-
-<file path=ppt/tags/tag9.xml><?xml version="1.0" encoding="utf-8"?>
-<p:tagLst xmlns:a="http://schemas.openxmlformats.org/drawingml/2006/main" xmlns:r="http://schemas.openxmlformats.org/officeDocument/2006/relationships" xmlns:p="http://schemas.openxmlformats.org/presentationml/2006/main">
-  <p:tag name="DVSHAPEID" val="pRYDDVOyZSvYcPCgmo8HGX"/>
-</p:tagLst>
-</file>
-
 <file path=ppt/theme/theme1.xml><?xml version="1.0" encoding="utf-8"?>
-<a:theme xmlns:a="http://schemas.openxmlformats.org/drawingml/2006/main" name="Headspring Design Template Clean">
+<a:theme xmlns:a="http://schemas.openxmlformats.org/drawingml/2006/main" name="Office Theme">
   <a:themeElements>
-    <a:clrScheme name="Office">
+    <a:clrScheme name="Blue Warm">
       <a:dk1>
         <a:sysClr val="windowText" lastClr="000000"/>
       </a:dk1>
@@ -9203,109 +9705,49 @@
         <a:sysClr val="window" lastClr="FFFFFF"/>
       </a:lt1>
       <a:dk2>
-        <a:srgbClr val="1F497D"/>
+        <a:srgbClr val="242852"/>
       </a:dk2>
       <a:lt2>
-        <a:srgbClr val="EEECE1"/>
+        <a:srgbClr val="ACCBF9"/>
       </a:lt2>
       <a:accent1>
-        <a:srgbClr val="4F81BD"/>
+        <a:srgbClr val="4A66AC"/>
       </a:accent1>
       <a:accent2>
-        <a:srgbClr val="C0504D"/>
+        <a:srgbClr val="629DD1"/>
       </a:accent2>
       <a:accent3>
-        <a:srgbClr val="9BBB59"/>
+        <a:srgbClr val="297FD5"/>
       </a:accent3>
       <a:accent4>
-        <a:srgbClr val="8064A2"/>
+        <a:srgbClr val="7F8FA9"/>
       </a:accent4>
       <a:accent5>
-        <a:srgbClr val="4BACC6"/>
+        <a:srgbClr val="5AA2AE"/>
       </a:accent5>
       <a:accent6>
-        <a:srgbClr val="F79646"/>
+        <a:srgbClr val="9D90A0"/>
       </a:accent6>
       <a:hlink>
-        <a:srgbClr val="0000FF"/>
+        <a:srgbClr val="9454C3"/>
       </a:hlink>
       <a:folHlink>
-        <a:srgbClr val="800080"/>
+        <a:srgbClr val="3EBBF0"/>
       </a:folHlink>
     </a:clrScheme>
-    <a:fontScheme name="Office">
+    <a:fontScheme name="Mensch">
       <a:majorFont>
-        <a:latin typeface="Calibri"/>
+        <a:latin typeface="Mensch"/>
         <a:ea typeface=""/>
         <a:cs typeface=""/>
-        <a:font script="Jpan" typeface="ＭＳ Ｐゴシック"/>
-        <a:font script="Hang" typeface="맑은 고딕"/>
-        <a:font script="Hans" typeface="宋体"/>
-        <a:font script="Hant" typeface="新細明體"/>
-        <a:font script="Arab" typeface="Times New Roman"/>
-        <a:font script="Hebr" typeface="Times New Roman"/>
-        <a:font script="Thai" typeface="Angsana New"/>
-        <a:font script="Ethi" typeface="Nyala"/>
-        <a:font script="Beng" typeface="Vrinda"/>
-        <a:font script="Gujr" typeface="Shruti"/>
-        <a:font script="Khmr" typeface="MoolBoran"/>
-        <a:font script="Knda" typeface="Tunga"/>
-        <a:font script="Guru" typeface="Raavi"/>
-        <a:font script="Cans" typeface="Euphemia"/>
-        <a:font script="Cher" typeface="Plantagenet Cherokee"/>
-        <a:font script="Yiii" typeface="Microsoft Yi Baiti"/>
-        <a:font script="Tibt" typeface="Microsoft Himalaya"/>
-        <a:font script="Thaa" typeface="MV Boli"/>
-        <a:font script="Deva" typeface="Mangal"/>
-        <a:font script="Telu" typeface="Gautami"/>
-        <a:font script="Taml" typeface="Latha"/>
-        <a:font script="Syrc" typeface="Estrangelo Edessa"/>
-        <a:font script="Orya" typeface="Kalinga"/>
-        <a:font script="Mlym" typeface="Kartika"/>
-        <a:font script="Laoo" typeface="DokChampa"/>
-        <a:font script="Sinh" typeface="Iskoola Pota"/>
-        <a:font script="Mong" typeface="Mongolian Baiti"/>
-        <a:font script="Viet" typeface="Times New Roman"/>
-        <a:font script="Uigh" typeface="Microsoft Uighur"/>
-        <a:font script="Geor" typeface="Sylfaen"/>
       </a:majorFont>
       <a:minorFont>
-        <a:latin typeface="Calibri"/>
+        <a:latin typeface="Mensch"/>
         <a:ea typeface=""/>
         <a:cs typeface=""/>
-        <a:font script="Jpan" typeface="ＭＳ Ｐゴシック"/>
-        <a:font script="Hang" typeface="맑은 고딕"/>
-        <a:font script="Hans" typeface="宋体"/>
-        <a:font script="Hant" typeface="新細明體"/>
-        <a:font script="Arab" typeface="Arial"/>
-        <a:font script="Hebr" typeface="Arial"/>
-        <a:font script="Thai" typeface="Cordia New"/>
-        <a:font script="Ethi" typeface="Nyala"/>
-        <a:font script="Beng" typeface="Vrinda"/>
-        <a:font script="Gujr" typeface="Shruti"/>
-        <a:font script="Khmr" typeface="DaunPenh"/>
-        <a:font script="Knda" typeface="Tunga"/>
-        <a:font script="Guru" typeface="Raavi"/>
-        <a:font script="Cans" typeface="Euphemia"/>
-        <a:font script="Cher" typeface="Plantagenet Cherokee"/>
-        <a:font script="Yiii" typeface="Microsoft Yi Baiti"/>
-        <a:font script="Tibt" typeface="Microsoft Himalaya"/>
-        <a:font script="Thaa" typeface="MV Boli"/>
-        <a:font script="Deva" typeface="Mangal"/>
-        <a:font script="Telu" typeface="Gautami"/>
-        <a:font script="Taml" typeface="Latha"/>
-        <a:font script="Syrc" typeface="Estrangelo Edessa"/>
-        <a:font script="Orya" typeface="Kalinga"/>
-        <a:font script="Mlym" typeface="Kartika"/>
-        <a:font script="Laoo" typeface="DokChampa"/>
-        <a:font script="Sinh" typeface="Iskoola Pota"/>
-        <a:font script="Mong" typeface="Mongolian Baiti"/>
-        <a:font script="Viet" typeface="Arial"/>
-        <a:font script="Uigh" typeface="Microsoft Uighur"/>
-        <a:font script="Geor" typeface="Sylfaen"/>
       </a:minorFont>
     </a:fontScheme>
-    <a:fmtScheme name="Office">
+    <a:fmtScheme name="Office Theme">
       <a:fillStyleLst>
         <a:solidFill>
           <a:schemeClr val="phClr"/>
@@ -9314,201 +9756,142 @@
           <a:gsLst>
             <a:gs pos="0">
               <a:schemeClr val="phClr">
-                <a:tint val="50000"/>
-                <a:satMod val="300000"/>
+                <a:lumMod val="110000"/>
+                <a:satMod val="105000"/>
+                <a:tint val="67000"/>
               </a:schemeClr>
             </a:gs>
-            <a:gs pos="35000">
+            <a:gs pos="50000">
               <a:schemeClr val="phClr">
-                <a:tint val="37000"/>
-                <a:satMod val="300000"/>
+                <a:lumMod val="105000"/>
+                <a:satMod val="103000"/>
+                <a:tint val="73000"/>
               </a:schemeClr>
             </a:gs>
             <a:gs pos="100000">
               <a:schemeClr val="phClr">
-                <a:tint val="15000"/>
-                <a:satMod val="350000"/>
+                <a:lumMod val="105000"/>
+                <a:satMod val="109000"/>
+                <a:tint val="81000"/>
               </a:schemeClr>
             </a:gs>
           </a:gsLst>
-          <a:lin ang="16200000" scaled="1"/>
+          <a:lin ang="5400000" scaled="0"/>
         </a:gradFill>
         <a:gradFill rotWithShape="1">
           <a:gsLst>
             <a:gs pos="0">
               <a:schemeClr val="phClr">
-                <a:tint val="100000"/>
+                <a:satMod val="103000"/>
+                <a:lumMod val="102000"/>
+                <a:tint val="94000"/>
+              </a:schemeClr>
+            </a:gs>
+            <a:gs pos="50000">
+              <a:schemeClr val="phClr">
+                <a:satMod val="110000"/>
+                <a:lumMod val="100000"/>
                 <a:shade val="100000"/>
-                <a:satMod val="130000"/>
               </a:schemeClr>
             </a:gs>
             <a:gs pos="100000">
               <a:schemeClr val="phClr">
-                <a:tint val="50000"/>
-                <a:shade val="100000"/>
-                <a:satMod val="350000"/>
+                <a:lumMod val="99000"/>
+                <a:satMod val="120000"/>
+                <a:shade val="78000"/>
               </a:schemeClr>
             </a:gs>
           </a:gsLst>
-          <a:lin ang="16200000" scaled="0"/>
+          <a:lin ang="5400000" scaled="0"/>
         </a:gradFill>
       </a:fillStyleLst>
       <a:lnStyleLst>
-        <a:ln w="9525" cap="flat" cmpd="sng" algn="ctr">
-          <a:solidFill>
-            <a:schemeClr val="phClr">
-              <a:shade val="95000"/>
-              <a:satMod val="105000"/>
-            </a:schemeClr>
-          </a:solidFill>
-          <a:prstDash val="solid"/>
-        </a:ln>
-        <a:ln w="25400" cap="flat" cmpd="sng" algn="ctr">
+        <a:ln w="6350" cap="flat" cmpd="sng" algn="ctr">
           <a:solidFill>
             <a:schemeClr val="phClr"/>
           </a:solidFill>
           <a:prstDash val="solid"/>
+          <a:miter lim="800000"/>
         </a:ln>
-        <a:ln w="38100" cap="flat" cmpd="sng" algn="ctr">
+        <a:ln w="12700" cap="flat" cmpd="sng" algn="ctr">
           <a:solidFill>
             <a:schemeClr val="phClr"/>
           </a:solidFill>
           <a:prstDash val="solid"/>
+          <a:miter lim="800000"/>
+        </a:ln>
+        <a:ln w="19050" cap="flat" cmpd="sng" algn="ctr">
+          <a:solidFill>
+            <a:schemeClr val="phClr"/>
+          </a:solidFill>
+          <a:prstDash val="solid"/>
+          <a:miter lim="800000"/>
         </a:ln>
       </a:lnStyleLst>
       <a:effectStyleLst>
         <a:effectStyle>
+          <a:effectLst/>
+        </a:effectStyle>
+        <a:effectStyle>
+          <a:effectLst/>
+        </a:effectStyle>
+        <a:effectStyle>
           <a:effectLst>
-            <a:outerShdw blurRad="40000" dist="20000" dir="5400000" rotWithShape="0">
+            <a:outerShdw blurRad="57150" dist="19050" dir="5400000" algn="ctr" rotWithShape="0">
               <a:srgbClr val="000000">
-                <a:alpha val="38000"/>
+                <a:alpha val="63000"/>
               </a:srgbClr>
             </a:outerShdw>
           </a:effectLst>
-        </a:effectStyle>
-        <a:effectStyle>
-          <a:effectLst>
-            <a:outerShdw blurRad="40000" dist="23000" dir="5400000" rotWithShape="0">
-              <a:srgbClr val="000000">
-                <a:alpha val="35000"/>
-              </a:srgbClr>
-            </a:outerShdw>
-          </a:effectLst>
-        </a:effectStyle>
-        <a:effectStyle>
-          <a:effectLst>
-            <a:outerShdw blurRad="40000" dist="23000" dir="5400000" rotWithShape="0">
-              <a:srgbClr val="000000">
-                <a:alpha val="35000"/>
-              </a:srgbClr>
-            </a:outerShdw>
-          </a:effectLst>
-          <a:scene3d>
-            <a:camera prst="orthographicFront">
-              <a:rot lat="0" lon="0" rev="0"/>
-            </a:camera>
-            <a:lightRig rig="threePt" dir="t">
-              <a:rot lat="0" lon="0" rev="1200000"/>
-            </a:lightRig>
-          </a:scene3d>
-          <a:sp3d>
-            <a:bevelT w="63500" h="25400"/>
-          </a:sp3d>
         </a:effectStyle>
       </a:effectStyleLst>
       <a:bgFillStyleLst>
         <a:solidFill>
           <a:schemeClr val="phClr"/>
         </a:solidFill>
+        <a:solidFill>
+          <a:schemeClr val="phClr">
+            <a:tint val="95000"/>
+            <a:satMod val="170000"/>
+          </a:schemeClr>
+        </a:solidFill>
         <a:gradFill rotWithShape="1">
           <a:gsLst>
             <a:gs pos="0">
               <a:schemeClr val="phClr">
-                <a:tint val="40000"/>
-                <a:satMod val="350000"/>
+                <a:tint val="93000"/>
+                <a:satMod val="150000"/>
+                <a:shade val="98000"/>
+                <a:lumMod val="102000"/>
               </a:schemeClr>
             </a:gs>
-            <a:gs pos="40000">
+            <a:gs pos="50000">
               <a:schemeClr val="phClr">
-                <a:tint val="45000"/>
-                <a:shade val="99000"/>
-                <a:satMod val="350000"/>
+                <a:tint val="98000"/>
+                <a:satMod val="130000"/>
+                <a:shade val="90000"/>
+                <a:lumMod val="103000"/>
               </a:schemeClr>
             </a:gs>
             <a:gs pos="100000">
               <a:schemeClr val="phClr">
-                <a:shade val="20000"/>
-                <a:satMod val="255000"/>
+                <a:shade val="63000"/>
+                <a:satMod val="120000"/>
               </a:schemeClr>
             </a:gs>
           </a:gsLst>
-          <a:path path="circle">
-            <a:fillToRect l="50000" t="-80000" r="50000" b="180000"/>
-          </a:path>
-        </a:gradFill>
-        <a:gradFill rotWithShape="1">
-          <a:gsLst>
-            <a:gs pos="0">
-              <a:schemeClr val="phClr">
-                <a:tint val="80000"/>
-                <a:satMod val="300000"/>
-              </a:schemeClr>
-            </a:gs>
-            <a:gs pos="100000">
-              <a:schemeClr val="phClr">
-                <a:shade val="30000"/>
-                <a:satMod val="200000"/>
-              </a:schemeClr>
-            </a:gs>
-          </a:gsLst>
-          <a:path path="circle">
-            <a:fillToRect l="50000" t="50000" r="50000" b="50000"/>
-          </a:path>
+          <a:lin ang="5400000" scaled="0"/>
         </a:gradFill>
       </a:bgFillStyleLst>
     </a:fmtScheme>
   </a:themeElements>
-  <a:objectDefaults>
-    <a:spDef>
-      <a:spPr/>
-      <a:bodyPr/>
-      <a:lstStyle/>
-      <a:style>
-        <a:lnRef idx="1">
-          <a:schemeClr val="accent1"/>
-        </a:lnRef>
-        <a:fillRef idx="3">
-          <a:schemeClr val="accent1"/>
-        </a:fillRef>
-        <a:effectRef idx="2">
-          <a:schemeClr val="accent1"/>
-        </a:effectRef>
-        <a:fontRef idx="minor">
-          <a:schemeClr val="lt1"/>
-        </a:fontRef>
-      </a:style>
-    </a:spDef>
-    <a:lnDef>
-      <a:spPr/>
-      <a:bodyPr/>
-      <a:lstStyle/>
-      <a:style>
-        <a:lnRef idx="2">
-          <a:schemeClr val="accent1"/>
-        </a:lnRef>
-        <a:fillRef idx="0">
-          <a:schemeClr val="accent1"/>
-        </a:fillRef>
-        <a:effectRef idx="1">
-          <a:schemeClr val="accent1"/>
-        </a:effectRef>
-        <a:fontRef idx="minor">
-          <a:schemeClr val="tx1"/>
-        </a:fontRef>
-      </a:style>
-    </a:lnDef>
-  </a:objectDefaults>
+  <a:objectDefaults/>
   <a:extraClrSchemeLst/>
+  <a:extLst>
+    <a:ext uri="{05A4C25C-085E-4340-85A3-A5531E510DB2}">
+      <thm15:themeFamily xmlns:thm15="http://schemas.microsoft.com/office/thememl/2012/main" name="Office Theme" id="{62F939B6-93AF-4DB8-9C6B-D6C7DFDC589F}" vid="{4A3C46E8-61CC-4603-A589-7422A47A8E4A}"/>
+    </a:ext>
+  </a:extLst>
 </a:theme>
 </file>
 

</xml_diff>